<commit_message>
update notes for cute layout. (#19)
* cute layout.

* cute layout.

---------

Co-authored-by: lcy-seso <lcy-seso@gmail.com>
</commit_message>
<xml_diff>
--- a/Cuda/cute/layout/figures/figures.pptx
+++ b/Cuda/cute/layout/figures/figures.pptx
@@ -5,10 +5,11 @@
     <p:sldMasterId id="2147483648" r:id="rId1"/>
   </p:sldMasterIdLst>
   <p:notesMasterIdLst>
-    <p:notesMasterId r:id="rId3"/>
+    <p:notesMasterId r:id="rId4"/>
   </p:notesMasterIdLst>
   <p:sldIdLst>
     <p:sldId id="256" r:id="rId2"/>
+    <p:sldId id="257" r:id="rId3"/>
   </p:sldIdLst>
   <p:sldSz cx="12192000" cy="6858000"/>
   <p:notesSz cx="6858000" cy="9144000"/>
@@ -115,7 +116,7 @@
             <a:srgbClr val="A4A3A4"/>
           </p15:clr>
         </p15:guide>
-        <p15:guide id="2" pos="3840" userDrawn="1">
+        <p15:guide id="2" pos="3114" userDrawn="1">
           <p15:clr>
             <a:srgbClr val="A4A3A4"/>
           </p15:clr>
@@ -208,7 +209,7 @@
           <a:p>
             <a:fld id="{A47AB2A2-815D-EF45-AF69-1D82858C2DA2}" type="datetimeFigureOut">
               <a:rPr kumimoji="1" lang="zh-CN" altLang="en-US" smtClean="0"/>
-              <a:t>2023/9/30</a:t>
+              <a:t>2023/10/7</a:t>
             </a:fld>
             <a:endParaRPr kumimoji="1" lang="zh-CN" altLang="en-US"/>
           </a:p>
@@ -706,7 +707,7 @@
           <a:p>
             <a:fld id="{446450CF-2172-2D43-A064-4BA9DA7DFF0D}" type="datetimeFigureOut">
               <a:rPr kumimoji="1" lang="zh-CN" altLang="en-US" smtClean="0"/>
-              <a:t>2023/9/30</a:t>
+              <a:t>2023/10/7</a:t>
             </a:fld>
             <a:endParaRPr kumimoji="1" lang="zh-CN" altLang="en-US"/>
           </a:p>
@@ -904,7 +905,7 @@
           <a:p>
             <a:fld id="{446450CF-2172-2D43-A064-4BA9DA7DFF0D}" type="datetimeFigureOut">
               <a:rPr kumimoji="1" lang="zh-CN" altLang="en-US" smtClean="0"/>
-              <a:t>2023/9/30</a:t>
+              <a:t>2023/10/7</a:t>
             </a:fld>
             <a:endParaRPr kumimoji="1" lang="zh-CN" altLang="en-US"/>
           </a:p>
@@ -1112,7 +1113,7 @@
           <a:p>
             <a:fld id="{446450CF-2172-2D43-A064-4BA9DA7DFF0D}" type="datetimeFigureOut">
               <a:rPr kumimoji="1" lang="zh-CN" altLang="en-US" smtClean="0"/>
-              <a:t>2023/9/30</a:t>
+              <a:t>2023/10/7</a:t>
             </a:fld>
             <a:endParaRPr kumimoji="1" lang="zh-CN" altLang="en-US"/>
           </a:p>
@@ -1310,7 +1311,7 @@
           <a:p>
             <a:fld id="{446450CF-2172-2D43-A064-4BA9DA7DFF0D}" type="datetimeFigureOut">
               <a:rPr kumimoji="1" lang="zh-CN" altLang="en-US" smtClean="0"/>
-              <a:t>2023/9/30</a:t>
+              <a:t>2023/10/7</a:t>
             </a:fld>
             <a:endParaRPr kumimoji="1" lang="zh-CN" altLang="en-US"/>
           </a:p>
@@ -1585,7 +1586,7 @@
           <a:p>
             <a:fld id="{446450CF-2172-2D43-A064-4BA9DA7DFF0D}" type="datetimeFigureOut">
               <a:rPr kumimoji="1" lang="zh-CN" altLang="en-US" smtClean="0"/>
-              <a:t>2023/9/30</a:t>
+              <a:t>2023/10/7</a:t>
             </a:fld>
             <a:endParaRPr kumimoji="1" lang="zh-CN" altLang="en-US"/>
           </a:p>
@@ -1850,7 +1851,7 @@
           <a:p>
             <a:fld id="{446450CF-2172-2D43-A064-4BA9DA7DFF0D}" type="datetimeFigureOut">
               <a:rPr kumimoji="1" lang="zh-CN" altLang="en-US" smtClean="0"/>
-              <a:t>2023/9/30</a:t>
+              <a:t>2023/10/7</a:t>
             </a:fld>
             <a:endParaRPr kumimoji="1" lang="zh-CN" altLang="en-US"/>
           </a:p>
@@ -2262,7 +2263,7 @@
           <a:p>
             <a:fld id="{446450CF-2172-2D43-A064-4BA9DA7DFF0D}" type="datetimeFigureOut">
               <a:rPr kumimoji="1" lang="zh-CN" altLang="en-US" smtClean="0"/>
-              <a:t>2023/9/30</a:t>
+              <a:t>2023/10/7</a:t>
             </a:fld>
             <a:endParaRPr kumimoji="1" lang="zh-CN" altLang="en-US"/>
           </a:p>
@@ -2403,7 +2404,7 @@
           <a:p>
             <a:fld id="{446450CF-2172-2D43-A064-4BA9DA7DFF0D}" type="datetimeFigureOut">
               <a:rPr kumimoji="1" lang="zh-CN" altLang="en-US" smtClean="0"/>
-              <a:t>2023/9/30</a:t>
+              <a:t>2023/10/7</a:t>
             </a:fld>
             <a:endParaRPr kumimoji="1" lang="zh-CN" altLang="en-US"/>
           </a:p>
@@ -2516,7 +2517,7 @@
           <a:p>
             <a:fld id="{446450CF-2172-2D43-A064-4BA9DA7DFF0D}" type="datetimeFigureOut">
               <a:rPr kumimoji="1" lang="zh-CN" altLang="en-US" smtClean="0"/>
-              <a:t>2023/9/30</a:t>
+              <a:t>2023/10/7</a:t>
             </a:fld>
             <a:endParaRPr kumimoji="1" lang="zh-CN" altLang="en-US"/>
           </a:p>
@@ -2827,7 +2828,7 @@
           <a:p>
             <a:fld id="{446450CF-2172-2D43-A064-4BA9DA7DFF0D}" type="datetimeFigureOut">
               <a:rPr kumimoji="1" lang="zh-CN" altLang="en-US" smtClean="0"/>
-              <a:t>2023/9/30</a:t>
+              <a:t>2023/10/7</a:t>
             </a:fld>
             <a:endParaRPr kumimoji="1" lang="zh-CN" altLang="en-US"/>
           </a:p>
@@ -3115,7 +3116,7 @@
           <a:p>
             <a:fld id="{446450CF-2172-2D43-A064-4BA9DA7DFF0D}" type="datetimeFigureOut">
               <a:rPr kumimoji="1" lang="zh-CN" altLang="en-US" smtClean="0"/>
-              <a:t>2023/9/30</a:t>
+              <a:t>2023/10/7</a:t>
             </a:fld>
             <a:endParaRPr kumimoji="1" lang="zh-CN" altLang="en-US"/>
           </a:p>
@@ -3356,7 +3357,7 @@
           <a:p>
             <a:fld id="{446450CF-2172-2D43-A064-4BA9DA7DFF0D}" type="datetimeFigureOut">
               <a:rPr kumimoji="1" lang="zh-CN" altLang="en-US" smtClean="0"/>
-              <a:t>2023/9/30</a:t>
+              <a:t>2023/10/7</a:t>
             </a:fld>
             <a:endParaRPr kumimoji="1" lang="zh-CN" altLang="en-US"/>
           </a:p>
@@ -9658,6 +9659,1777 @@
 </p:sld>
 </file>
 
+<file path=ppt/slides/slide2.xml><?xml version="1.0" encoding="utf-8"?>
+<p:sld xmlns:a="http://schemas.openxmlformats.org/drawingml/2006/main" xmlns:r="http://schemas.openxmlformats.org/officeDocument/2006/relationships" xmlns:p="http://schemas.openxmlformats.org/presentationml/2006/main">
+  <p:cSld>
+    <p:spTree>
+      <p:nvGrpSpPr>
+        <p:cNvPr id="1" name=""/>
+        <p:cNvGrpSpPr/>
+        <p:nvPr/>
+      </p:nvGrpSpPr>
+      <p:grpSpPr>
+        <a:xfrm>
+          <a:off x="0" y="0"/>
+          <a:ext cx="0" cy="0"/>
+          <a:chOff x="0" y="0"/>
+          <a:chExt cx="0" cy="0"/>
+        </a:xfrm>
+      </p:grpSpPr>
+      <p:sp>
+        <p:nvSpPr>
+          <p:cNvPr id="27" name="椭圆 26">
+            <a:extLst>
+              <a:ext uri="{FF2B5EF4-FFF2-40B4-BE49-F238E27FC236}">
+                <a16:creationId xmlns:a16="http://schemas.microsoft.com/office/drawing/2014/main" id="{37A9D3C5-792B-C199-F222-9DF1660397EF}"/>
+              </a:ext>
+            </a:extLst>
+          </p:cNvPr>
+          <p:cNvSpPr/>
+          <p:nvPr/>
+        </p:nvSpPr>
+        <p:spPr>
+          <a:xfrm>
+            <a:off x="2551611" y="1349828"/>
+            <a:ext cx="1053738" cy="2612569"/>
+          </a:xfrm>
+          <a:prstGeom prst="ellipse">
+            <a:avLst/>
+          </a:prstGeom>
+          <a:solidFill>
+            <a:schemeClr val="accent5">
+              <a:lumMod val="20000"/>
+              <a:lumOff val="80000"/>
+            </a:schemeClr>
+          </a:solidFill>
+          <a:ln>
+            <a:solidFill>
+              <a:schemeClr val="accent5">
+                <a:lumMod val="75000"/>
+              </a:schemeClr>
+            </a:solidFill>
+          </a:ln>
+        </p:spPr>
+        <p:style>
+          <a:lnRef idx="2">
+            <a:schemeClr val="accent1">
+              <a:shade val="15000"/>
+            </a:schemeClr>
+          </a:lnRef>
+          <a:fillRef idx="1">
+            <a:schemeClr val="accent1"/>
+          </a:fillRef>
+          <a:effectRef idx="0">
+            <a:schemeClr val="accent1"/>
+          </a:effectRef>
+          <a:fontRef idx="minor">
+            <a:schemeClr val="lt1"/>
+          </a:fontRef>
+        </p:style>
+        <p:txBody>
+          <a:bodyPr rtlCol="0" anchor="ctr"/>
+          <a:lstStyle/>
+          <a:p>
+            <a:pPr algn="ctr"/>
+            <a:endParaRPr kumimoji="1" lang="zh-CN" altLang="en-US"/>
+          </a:p>
+        </p:txBody>
+      </p:sp>
+      <p:sp>
+        <p:nvSpPr>
+          <p:cNvPr id="28" name="椭圆 27">
+            <a:extLst>
+              <a:ext uri="{FF2B5EF4-FFF2-40B4-BE49-F238E27FC236}">
+                <a16:creationId xmlns:a16="http://schemas.microsoft.com/office/drawing/2014/main" id="{B197DF36-D5A2-EE80-553E-E8DF3BAD4FD8}"/>
+              </a:ext>
+            </a:extLst>
+          </p:cNvPr>
+          <p:cNvSpPr/>
+          <p:nvPr/>
+        </p:nvSpPr>
+        <p:spPr>
+          <a:xfrm>
+            <a:off x="2725783" y="1541415"/>
+            <a:ext cx="714105" cy="1367242"/>
+          </a:xfrm>
+          <a:prstGeom prst="ellipse">
+            <a:avLst/>
+          </a:prstGeom>
+          <a:solidFill>
+            <a:schemeClr val="accent2">
+              <a:lumMod val="20000"/>
+              <a:lumOff val="80000"/>
+            </a:schemeClr>
+          </a:solidFill>
+          <a:ln>
+            <a:solidFill>
+              <a:schemeClr val="accent2">
+                <a:lumMod val="75000"/>
+              </a:schemeClr>
+            </a:solidFill>
+          </a:ln>
+        </p:spPr>
+        <p:style>
+          <a:lnRef idx="2">
+            <a:schemeClr val="accent1">
+              <a:shade val="15000"/>
+            </a:schemeClr>
+          </a:lnRef>
+          <a:fillRef idx="1">
+            <a:schemeClr val="accent1"/>
+          </a:fillRef>
+          <a:effectRef idx="0">
+            <a:schemeClr val="accent1"/>
+          </a:effectRef>
+          <a:fontRef idx="minor">
+            <a:schemeClr val="lt1"/>
+          </a:fontRef>
+        </p:style>
+        <p:txBody>
+          <a:bodyPr rtlCol="0" anchor="ctr"/>
+          <a:lstStyle/>
+          <a:p>
+            <a:pPr algn="ctr"/>
+            <a:endParaRPr kumimoji="1" lang="zh-CN" altLang="en-US"/>
+          </a:p>
+        </p:txBody>
+      </p:sp>
+      <p:sp>
+        <p:nvSpPr>
+          <p:cNvPr id="26" name="椭圆 25">
+            <a:extLst>
+              <a:ext uri="{FF2B5EF4-FFF2-40B4-BE49-F238E27FC236}">
+                <a16:creationId xmlns:a16="http://schemas.microsoft.com/office/drawing/2014/main" id="{D8FCB6CC-61FD-194E-93D2-298CD4338E87}"/>
+              </a:ext>
+            </a:extLst>
+          </p:cNvPr>
+          <p:cNvSpPr/>
+          <p:nvPr/>
+        </p:nvSpPr>
+        <p:spPr>
+          <a:xfrm>
+            <a:off x="1715589" y="1349829"/>
+            <a:ext cx="670560" cy="1820091"/>
+          </a:xfrm>
+          <a:prstGeom prst="ellipse">
+            <a:avLst/>
+          </a:prstGeom>
+          <a:solidFill>
+            <a:schemeClr val="tx2">
+              <a:lumMod val="10000"/>
+              <a:lumOff val="90000"/>
+            </a:schemeClr>
+          </a:solidFill>
+        </p:spPr>
+        <p:style>
+          <a:lnRef idx="2">
+            <a:schemeClr val="accent1">
+              <a:shade val="15000"/>
+            </a:schemeClr>
+          </a:lnRef>
+          <a:fillRef idx="1">
+            <a:schemeClr val="accent1"/>
+          </a:fillRef>
+          <a:effectRef idx="0">
+            <a:schemeClr val="accent1"/>
+          </a:effectRef>
+          <a:fontRef idx="minor">
+            <a:schemeClr val="lt1"/>
+          </a:fontRef>
+        </p:style>
+        <p:txBody>
+          <a:bodyPr rtlCol="0" anchor="ctr"/>
+          <a:lstStyle/>
+          <a:p>
+            <a:pPr algn="ctr"/>
+            <a:endParaRPr kumimoji="1" lang="zh-CN" altLang="en-US" dirty="0"/>
+          </a:p>
+        </p:txBody>
+      </p:sp>
+      <p:sp>
+        <p:nvSpPr>
+          <p:cNvPr id="4" name="矩形 3">
+            <a:extLst>
+              <a:ext uri="{FF2B5EF4-FFF2-40B4-BE49-F238E27FC236}">
+                <a16:creationId xmlns:a16="http://schemas.microsoft.com/office/drawing/2014/main" id="{F8192B7E-410B-3877-FDD9-598BD6AEC41B}"/>
+              </a:ext>
+            </a:extLst>
+          </p:cNvPr>
+          <p:cNvSpPr/>
+          <p:nvPr/>
+        </p:nvSpPr>
+        <p:spPr>
+          <a:xfrm>
+            <a:off x="1872343" y="1584960"/>
+            <a:ext cx="339634" cy="339634"/>
+          </a:xfrm>
+          <a:prstGeom prst="rect">
+            <a:avLst/>
+          </a:prstGeom>
+          <a:noFill/>
+          <a:ln>
+            <a:noFill/>
+          </a:ln>
+        </p:spPr>
+        <p:style>
+          <a:lnRef idx="2">
+            <a:schemeClr val="accent1">
+              <a:shade val="15000"/>
+            </a:schemeClr>
+          </a:lnRef>
+          <a:fillRef idx="1">
+            <a:schemeClr val="accent1"/>
+          </a:fillRef>
+          <a:effectRef idx="0">
+            <a:schemeClr val="accent1"/>
+          </a:effectRef>
+          <a:fontRef idx="minor">
+            <a:schemeClr val="lt1"/>
+          </a:fontRef>
+        </p:style>
+        <p:txBody>
+          <a:bodyPr rtlCol="0" anchor="ctr"/>
+          <a:lstStyle/>
+          <a:p>
+            <a:pPr algn="ctr"/>
+            <a:r>
+              <a:rPr kumimoji="1" lang="en-US" altLang="zh-CN" b="1" dirty="0">
+                <a:solidFill>
+                  <a:srgbClr val="00B0F0"/>
+                </a:solidFill>
+                <a:latin typeface="Bradley Hand" pitchFamily="2" charset="0"/>
+              </a:rPr>
+              <a:t>0</a:t>
+            </a:r>
+            <a:endParaRPr kumimoji="1" lang="zh-CN" altLang="en-US" b="1" dirty="0">
+              <a:solidFill>
+                <a:srgbClr val="00B0F0"/>
+              </a:solidFill>
+              <a:latin typeface="Bradley Hand" pitchFamily="2" charset="0"/>
+            </a:endParaRPr>
+          </a:p>
+        </p:txBody>
+      </p:sp>
+      <p:sp>
+        <p:nvSpPr>
+          <p:cNvPr id="5" name="矩形 4">
+            <a:extLst>
+              <a:ext uri="{FF2B5EF4-FFF2-40B4-BE49-F238E27FC236}">
+                <a16:creationId xmlns:a16="http://schemas.microsoft.com/office/drawing/2014/main" id="{2DF1D6BB-6A69-EA20-E931-CE9E5711715C}"/>
+              </a:ext>
+            </a:extLst>
+          </p:cNvPr>
+          <p:cNvSpPr/>
+          <p:nvPr/>
+        </p:nvSpPr>
+        <p:spPr>
+          <a:xfrm>
+            <a:off x="1872343" y="1924594"/>
+            <a:ext cx="339634" cy="339634"/>
+          </a:xfrm>
+          <a:prstGeom prst="rect">
+            <a:avLst/>
+          </a:prstGeom>
+          <a:noFill/>
+          <a:ln>
+            <a:noFill/>
+          </a:ln>
+        </p:spPr>
+        <p:style>
+          <a:lnRef idx="2">
+            <a:schemeClr val="accent1">
+              <a:shade val="15000"/>
+            </a:schemeClr>
+          </a:lnRef>
+          <a:fillRef idx="1">
+            <a:schemeClr val="accent1"/>
+          </a:fillRef>
+          <a:effectRef idx="0">
+            <a:schemeClr val="accent1"/>
+          </a:effectRef>
+          <a:fontRef idx="minor">
+            <a:schemeClr val="lt1"/>
+          </a:fontRef>
+        </p:style>
+        <p:txBody>
+          <a:bodyPr rtlCol="0" anchor="ctr"/>
+          <a:lstStyle/>
+          <a:p>
+            <a:pPr algn="ctr"/>
+            <a:r>
+              <a:rPr kumimoji="1" lang="en-US" altLang="zh-CN" b="1" dirty="0">
+                <a:solidFill>
+                  <a:srgbClr val="00B0F0"/>
+                </a:solidFill>
+                <a:latin typeface="Bradley Hand" pitchFamily="2" charset="0"/>
+              </a:rPr>
+              <a:t>1</a:t>
+            </a:r>
+            <a:endParaRPr kumimoji="1" lang="zh-CN" altLang="en-US" b="1" dirty="0">
+              <a:solidFill>
+                <a:srgbClr val="00B0F0"/>
+              </a:solidFill>
+              <a:latin typeface="Bradley Hand" pitchFamily="2" charset="0"/>
+            </a:endParaRPr>
+          </a:p>
+        </p:txBody>
+      </p:sp>
+      <p:sp>
+        <p:nvSpPr>
+          <p:cNvPr id="6" name="矩形 5">
+            <a:extLst>
+              <a:ext uri="{FF2B5EF4-FFF2-40B4-BE49-F238E27FC236}">
+                <a16:creationId xmlns:a16="http://schemas.microsoft.com/office/drawing/2014/main" id="{C626B6A4-8CDD-DBEA-0A87-8C831572CFCD}"/>
+              </a:ext>
+            </a:extLst>
+          </p:cNvPr>
+          <p:cNvSpPr/>
+          <p:nvPr/>
+        </p:nvSpPr>
+        <p:spPr>
+          <a:xfrm>
+            <a:off x="1872343" y="2264228"/>
+            <a:ext cx="339634" cy="339634"/>
+          </a:xfrm>
+          <a:prstGeom prst="rect">
+            <a:avLst/>
+          </a:prstGeom>
+          <a:noFill/>
+          <a:ln>
+            <a:noFill/>
+          </a:ln>
+        </p:spPr>
+        <p:style>
+          <a:lnRef idx="2">
+            <a:schemeClr val="accent1">
+              <a:shade val="15000"/>
+            </a:schemeClr>
+          </a:lnRef>
+          <a:fillRef idx="1">
+            <a:schemeClr val="accent1"/>
+          </a:fillRef>
+          <a:effectRef idx="0">
+            <a:schemeClr val="accent1"/>
+          </a:effectRef>
+          <a:fontRef idx="minor">
+            <a:schemeClr val="lt1"/>
+          </a:fontRef>
+        </p:style>
+        <p:txBody>
+          <a:bodyPr rtlCol="0" anchor="ctr"/>
+          <a:lstStyle/>
+          <a:p>
+            <a:pPr algn="ctr"/>
+            <a:r>
+              <a:rPr kumimoji="1" lang="en-US" altLang="zh-CN" b="1" dirty="0">
+                <a:solidFill>
+                  <a:srgbClr val="00B0F0"/>
+                </a:solidFill>
+                <a:latin typeface="Bradley Hand" pitchFamily="2" charset="0"/>
+              </a:rPr>
+              <a:t>2</a:t>
+            </a:r>
+            <a:endParaRPr kumimoji="1" lang="zh-CN" altLang="en-US" b="1" dirty="0">
+              <a:solidFill>
+                <a:srgbClr val="00B0F0"/>
+              </a:solidFill>
+              <a:latin typeface="Bradley Hand" pitchFamily="2" charset="0"/>
+            </a:endParaRPr>
+          </a:p>
+        </p:txBody>
+      </p:sp>
+      <p:sp>
+        <p:nvSpPr>
+          <p:cNvPr id="7" name="矩形 6">
+            <a:extLst>
+              <a:ext uri="{FF2B5EF4-FFF2-40B4-BE49-F238E27FC236}">
+                <a16:creationId xmlns:a16="http://schemas.microsoft.com/office/drawing/2014/main" id="{DFC4017A-0501-2979-8883-EACFD70611A5}"/>
+              </a:ext>
+            </a:extLst>
+          </p:cNvPr>
+          <p:cNvSpPr/>
+          <p:nvPr/>
+        </p:nvSpPr>
+        <p:spPr>
+          <a:xfrm>
+            <a:off x="1872343" y="2603862"/>
+            <a:ext cx="339634" cy="339634"/>
+          </a:xfrm>
+          <a:prstGeom prst="rect">
+            <a:avLst/>
+          </a:prstGeom>
+          <a:noFill/>
+          <a:ln>
+            <a:noFill/>
+          </a:ln>
+        </p:spPr>
+        <p:style>
+          <a:lnRef idx="2">
+            <a:schemeClr val="accent1">
+              <a:shade val="15000"/>
+            </a:schemeClr>
+          </a:lnRef>
+          <a:fillRef idx="1">
+            <a:schemeClr val="accent1"/>
+          </a:fillRef>
+          <a:effectRef idx="0">
+            <a:schemeClr val="accent1"/>
+          </a:effectRef>
+          <a:fontRef idx="minor">
+            <a:schemeClr val="lt1"/>
+          </a:fontRef>
+        </p:style>
+        <p:txBody>
+          <a:bodyPr rtlCol="0" anchor="ctr"/>
+          <a:lstStyle/>
+          <a:p>
+            <a:pPr algn="ctr"/>
+            <a:r>
+              <a:rPr kumimoji="1" lang="en-US" altLang="zh-CN" b="1" dirty="0">
+                <a:solidFill>
+                  <a:srgbClr val="00B0F0"/>
+                </a:solidFill>
+                <a:latin typeface="Bradley Hand" pitchFamily="2" charset="0"/>
+              </a:rPr>
+              <a:t>3</a:t>
+            </a:r>
+            <a:endParaRPr kumimoji="1" lang="zh-CN" altLang="en-US" b="1" dirty="0">
+              <a:solidFill>
+                <a:srgbClr val="00B0F0"/>
+              </a:solidFill>
+              <a:latin typeface="Bradley Hand" pitchFamily="2" charset="0"/>
+            </a:endParaRPr>
+          </a:p>
+        </p:txBody>
+      </p:sp>
+      <p:sp>
+        <p:nvSpPr>
+          <p:cNvPr id="8" name="矩形 7">
+            <a:extLst>
+              <a:ext uri="{FF2B5EF4-FFF2-40B4-BE49-F238E27FC236}">
+                <a16:creationId xmlns:a16="http://schemas.microsoft.com/office/drawing/2014/main" id="{DCC5CABE-0F8B-26E6-D9B3-8B0848C2F4B8}"/>
+              </a:ext>
+            </a:extLst>
+          </p:cNvPr>
+          <p:cNvSpPr/>
+          <p:nvPr/>
+        </p:nvSpPr>
+        <p:spPr>
+          <a:xfrm>
+            <a:off x="2921726" y="1584960"/>
+            <a:ext cx="339634" cy="339634"/>
+          </a:xfrm>
+          <a:prstGeom prst="rect">
+            <a:avLst/>
+          </a:prstGeom>
+          <a:noFill/>
+          <a:ln>
+            <a:noFill/>
+          </a:ln>
+        </p:spPr>
+        <p:style>
+          <a:lnRef idx="2">
+            <a:schemeClr val="accent1">
+              <a:shade val="15000"/>
+            </a:schemeClr>
+          </a:lnRef>
+          <a:fillRef idx="1">
+            <a:schemeClr val="accent1"/>
+          </a:fillRef>
+          <a:effectRef idx="0">
+            <a:schemeClr val="accent1"/>
+          </a:effectRef>
+          <a:fontRef idx="minor">
+            <a:schemeClr val="lt1"/>
+          </a:fontRef>
+        </p:style>
+        <p:txBody>
+          <a:bodyPr rtlCol="0" anchor="ctr"/>
+          <a:lstStyle/>
+          <a:p>
+            <a:pPr algn="ctr"/>
+            <a:r>
+              <a:rPr kumimoji="1" lang="en-US" altLang="zh-CN" b="1" dirty="0">
+                <a:solidFill>
+                  <a:srgbClr val="FF0000"/>
+                </a:solidFill>
+                <a:latin typeface="Bradley Hand" pitchFamily="2" charset="0"/>
+              </a:rPr>
+              <a:t>0</a:t>
+            </a:r>
+            <a:endParaRPr kumimoji="1" lang="zh-CN" altLang="en-US" b="1" dirty="0">
+              <a:solidFill>
+                <a:srgbClr val="FF0000"/>
+              </a:solidFill>
+              <a:latin typeface="Bradley Hand" pitchFamily="2" charset="0"/>
+            </a:endParaRPr>
+          </a:p>
+        </p:txBody>
+      </p:sp>
+      <p:sp>
+        <p:nvSpPr>
+          <p:cNvPr id="9" name="矩形 8">
+            <a:extLst>
+              <a:ext uri="{FF2B5EF4-FFF2-40B4-BE49-F238E27FC236}">
+                <a16:creationId xmlns:a16="http://schemas.microsoft.com/office/drawing/2014/main" id="{BB54A311-D937-17E3-704B-9B25A809EE49}"/>
+              </a:ext>
+            </a:extLst>
+          </p:cNvPr>
+          <p:cNvSpPr/>
+          <p:nvPr/>
+        </p:nvSpPr>
+        <p:spPr>
+          <a:xfrm>
+            <a:off x="2921726" y="1924594"/>
+            <a:ext cx="339634" cy="339634"/>
+          </a:xfrm>
+          <a:prstGeom prst="rect">
+            <a:avLst/>
+          </a:prstGeom>
+          <a:noFill/>
+          <a:ln>
+            <a:noFill/>
+          </a:ln>
+        </p:spPr>
+        <p:style>
+          <a:lnRef idx="2">
+            <a:schemeClr val="accent1">
+              <a:shade val="15000"/>
+            </a:schemeClr>
+          </a:lnRef>
+          <a:fillRef idx="1">
+            <a:schemeClr val="accent1"/>
+          </a:fillRef>
+          <a:effectRef idx="0">
+            <a:schemeClr val="accent1"/>
+          </a:effectRef>
+          <a:fontRef idx="minor">
+            <a:schemeClr val="lt1"/>
+          </a:fontRef>
+        </p:style>
+        <p:txBody>
+          <a:bodyPr rtlCol="0" anchor="ctr"/>
+          <a:lstStyle/>
+          <a:p>
+            <a:pPr algn="ctr"/>
+            <a:r>
+              <a:rPr kumimoji="1" lang="en-US" altLang="zh-CN" b="1" dirty="0">
+                <a:solidFill>
+                  <a:srgbClr val="FF0000"/>
+                </a:solidFill>
+                <a:latin typeface="Bradley Hand" pitchFamily="2" charset="0"/>
+              </a:rPr>
+              <a:t>2</a:t>
+            </a:r>
+            <a:endParaRPr kumimoji="1" lang="zh-CN" altLang="en-US" b="1" dirty="0">
+              <a:solidFill>
+                <a:srgbClr val="FF0000"/>
+              </a:solidFill>
+              <a:latin typeface="Bradley Hand" pitchFamily="2" charset="0"/>
+            </a:endParaRPr>
+          </a:p>
+        </p:txBody>
+      </p:sp>
+      <p:sp>
+        <p:nvSpPr>
+          <p:cNvPr id="10" name="矩形 9">
+            <a:extLst>
+              <a:ext uri="{FF2B5EF4-FFF2-40B4-BE49-F238E27FC236}">
+                <a16:creationId xmlns:a16="http://schemas.microsoft.com/office/drawing/2014/main" id="{419ADC26-1B1E-0839-2B3E-ED3099768DE2}"/>
+              </a:ext>
+            </a:extLst>
+          </p:cNvPr>
+          <p:cNvSpPr/>
+          <p:nvPr/>
+        </p:nvSpPr>
+        <p:spPr>
+          <a:xfrm>
+            <a:off x="2921726" y="2264228"/>
+            <a:ext cx="339634" cy="339634"/>
+          </a:xfrm>
+          <a:prstGeom prst="rect">
+            <a:avLst/>
+          </a:prstGeom>
+          <a:noFill/>
+          <a:ln>
+            <a:noFill/>
+          </a:ln>
+        </p:spPr>
+        <p:style>
+          <a:lnRef idx="2">
+            <a:schemeClr val="accent1">
+              <a:shade val="15000"/>
+            </a:schemeClr>
+          </a:lnRef>
+          <a:fillRef idx="1">
+            <a:schemeClr val="accent1"/>
+          </a:fillRef>
+          <a:effectRef idx="0">
+            <a:schemeClr val="accent1"/>
+          </a:effectRef>
+          <a:fontRef idx="minor">
+            <a:schemeClr val="lt1"/>
+          </a:fontRef>
+        </p:style>
+        <p:txBody>
+          <a:bodyPr rtlCol="0" anchor="ctr"/>
+          <a:lstStyle/>
+          <a:p>
+            <a:pPr algn="ctr"/>
+            <a:r>
+              <a:rPr kumimoji="1" lang="en-US" altLang="zh-CN" b="1" dirty="0">
+                <a:solidFill>
+                  <a:srgbClr val="FF0000"/>
+                </a:solidFill>
+                <a:latin typeface="Bradley Hand" pitchFamily="2" charset="0"/>
+              </a:rPr>
+              <a:t>4</a:t>
+            </a:r>
+            <a:endParaRPr kumimoji="1" lang="zh-CN" altLang="en-US" b="1" dirty="0">
+              <a:solidFill>
+                <a:srgbClr val="FF0000"/>
+              </a:solidFill>
+              <a:latin typeface="Bradley Hand" pitchFamily="2" charset="0"/>
+            </a:endParaRPr>
+          </a:p>
+        </p:txBody>
+      </p:sp>
+      <p:sp>
+        <p:nvSpPr>
+          <p:cNvPr id="11" name="矩形 10">
+            <a:extLst>
+              <a:ext uri="{FF2B5EF4-FFF2-40B4-BE49-F238E27FC236}">
+                <a16:creationId xmlns:a16="http://schemas.microsoft.com/office/drawing/2014/main" id="{80366012-72A8-0B91-F137-9BA82C092973}"/>
+              </a:ext>
+            </a:extLst>
+          </p:cNvPr>
+          <p:cNvSpPr/>
+          <p:nvPr/>
+        </p:nvSpPr>
+        <p:spPr>
+          <a:xfrm>
+            <a:off x="2921726" y="2603862"/>
+            <a:ext cx="339634" cy="339634"/>
+          </a:xfrm>
+          <a:prstGeom prst="rect">
+            <a:avLst/>
+          </a:prstGeom>
+          <a:noFill/>
+          <a:ln>
+            <a:noFill/>
+          </a:ln>
+        </p:spPr>
+        <p:style>
+          <a:lnRef idx="2">
+            <a:schemeClr val="accent1">
+              <a:shade val="15000"/>
+            </a:schemeClr>
+          </a:lnRef>
+          <a:fillRef idx="1">
+            <a:schemeClr val="accent1"/>
+          </a:fillRef>
+          <a:effectRef idx="0">
+            <a:schemeClr val="accent1"/>
+          </a:effectRef>
+          <a:fontRef idx="minor">
+            <a:schemeClr val="lt1"/>
+          </a:fontRef>
+        </p:style>
+        <p:txBody>
+          <a:bodyPr rtlCol="0" anchor="ctr"/>
+          <a:lstStyle/>
+          <a:p>
+            <a:pPr algn="ctr"/>
+            <a:r>
+              <a:rPr kumimoji="1" lang="en-US" altLang="zh-CN" b="1" dirty="0">
+                <a:solidFill>
+                  <a:srgbClr val="FF0000"/>
+                </a:solidFill>
+                <a:latin typeface="Bradley Hand" pitchFamily="2" charset="0"/>
+              </a:rPr>
+              <a:t>6</a:t>
+            </a:r>
+            <a:endParaRPr kumimoji="1" lang="zh-CN" altLang="en-US" b="1" dirty="0">
+              <a:solidFill>
+                <a:srgbClr val="FF0000"/>
+              </a:solidFill>
+              <a:latin typeface="Bradley Hand" pitchFamily="2" charset="0"/>
+            </a:endParaRPr>
+          </a:p>
+        </p:txBody>
+      </p:sp>
+      <p:sp>
+        <p:nvSpPr>
+          <p:cNvPr id="12" name="矩形 11">
+            <a:extLst>
+              <a:ext uri="{FF2B5EF4-FFF2-40B4-BE49-F238E27FC236}">
+                <a16:creationId xmlns:a16="http://schemas.microsoft.com/office/drawing/2014/main" id="{3844BC39-70FF-AAC3-7DB9-28C2ED897FFE}"/>
+              </a:ext>
+            </a:extLst>
+          </p:cNvPr>
+          <p:cNvSpPr/>
+          <p:nvPr/>
+        </p:nvSpPr>
+        <p:spPr>
+          <a:xfrm>
+            <a:off x="2921726" y="2943496"/>
+            <a:ext cx="339634" cy="339634"/>
+          </a:xfrm>
+          <a:prstGeom prst="rect">
+            <a:avLst/>
+          </a:prstGeom>
+          <a:noFill/>
+          <a:ln>
+            <a:noFill/>
+          </a:ln>
+        </p:spPr>
+        <p:style>
+          <a:lnRef idx="2">
+            <a:schemeClr val="accent1">
+              <a:shade val="15000"/>
+            </a:schemeClr>
+          </a:lnRef>
+          <a:fillRef idx="1">
+            <a:schemeClr val="accent1"/>
+          </a:fillRef>
+          <a:effectRef idx="0">
+            <a:schemeClr val="accent1"/>
+          </a:effectRef>
+          <a:fontRef idx="minor">
+            <a:schemeClr val="lt1"/>
+          </a:fontRef>
+        </p:style>
+        <p:txBody>
+          <a:bodyPr rtlCol="0" anchor="ctr"/>
+          <a:lstStyle/>
+          <a:p>
+            <a:pPr algn="ctr"/>
+            <a:r>
+              <a:rPr kumimoji="1" lang="en-US" altLang="zh-CN" b="1" dirty="0">
+                <a:solidFill>
+                  <a:schemeClr val="tx1"/>
+                </a:solidFill>
+                <a:latin typeface="Bradley Hand" pitchFamily="2" charset="0"/>
+              </a:rPr>
+              <a:t>1</a:t>
+            </a:r>
+            <a:endParaRPr kumimoji="1" lang="zh-CN" altLang="en-US" b="1" dirty="0">
+              <a:solidFill>
+                <a:schemeClr val="tx1"/>
+              </a:solidFill>
+              <a:latin typeface="Bradley Hand" pitchFamily="2" charset="0"/>
+            </a:endParaRPr>
+          </a:p>
+        </p:txBody>
+      </p:sp>
+      <p:sp>
+        <p:nvSpPr>
+          <p:cNvPr id="13" name="矩形 12">
+            <a:extLst>
+              <a:ext uri="{FF2B5EF4-FFF2-40B4-BE49-F238E27FC236}">
+                <a16:creationId xmlns:a16="http://schemas.microsoft.com/office/drawing/2014/main" id="{4AC3C16E-BFDB-4020-3AE7-C7E4AE9D4019}"/>
+              </a:ext>
+            </a:extLst>
+          </p:cNvPr>
+          <p:cNvSpPr/>
+          <p:nvPr/>
+        </p:nvSpPr>
+        <p:spPr>
+          <a:xfrm>
+            <a:off x="2921726" y="3283130"/>
+            <a:ext cx="339634" cy="339634"/>
+          </a:xfrm>
+          <a:prstGeom prst="rect">
+            <a:avLst/>
+          </a:prstGeom>
+          <a:noFill/>
+          <a:ln>
+            <a:noFill/>
+          </a:ln>
+        </p:spPr>
+        <p:style>
+          <a:lnRef idx="2">
+            <a:schemeClr val="accent1">
+              <a:shade val="15000"/>
+            </a:schemeClr>
+          </a:lnRef>
+          <a:fillRef idx="1">
+            <a:schemeClr val="accent1"/>
+          </a:fillRef>
+          <a:effectRef idx="0">
+            <a:schemeClr val="accent1"/>
+          </a:effectRef>
+          <a:fontRef idx="minor">
+            <a:schemeClr val="lt1"/>
+          </a:fontRef>
+        </p:style>
+        <p:txBody>
+          <a:bodyPr rtlCol="0" anchor="ctr"/>
+          <a:lstStyle/>
+          <a:p>
+            <a:pPr algn="ctr"/>
+            <a:r>
+              <a:rPr kumimoji="1" lang="en-US" altLang="zh-CN" b="1" dirty="0">
+                <a:solidFill>
+                  <a:schemeClr val="tx1"/>
+                </a:solidFill>
+                <a:latin typeface="Bradley Hand" pitchFamily="2" charset="0"/>
+              </a:rPr>
+              <a:t>3</a:t>
+            </a:r>
+            <a:endParaRPr kumimoji="1" lang="zh-CN" altLang="en-US" b="1" dirty="0">
+              <a:solidFill>
+                <a:schemeClr val="tx1"/>
+              </a:solidFill>
+              <a:latin typeface="Bradley Hand" pitchFamily="2" charset="0"/>
+            </a:endParaRPr>
+          </a:p>
+        </p:txBody>
+      </p:sp>
+      <p:sp>
+        <p:nvSpPr>
+          <p:cNvPr id="14" name="矩形 13">
+            <a:extLst>
+              <a:ext uri="{FF2B5EF4-FFF2-40B4-BE49-F238E27FC236}">
+                <a16:creationId xmlns:a16="http://schemas.microsoft.com/office/drawing/2014/main" id="{CC21038C-4FC8-1224-279B-40CB5E34DA59}"/>
+              </a:ext>
+            </a:extLst>
+          </p:cNvPr>
+          <p:cNvSpPr/>
+          <p:nvPr/>
+        </p:nvSpPr>
+        <p:spPr>
+          <a:xfrm>
+            <a:off x="2921726" y="3622764"/>
+            <a:ext cx="339634" cy="339634"/>
+          </a:xfrm>
+          <a:prstGeom prst="rect">
+            <a:avLst/>
+          </a:prstGeom>
+          <a:noFill/>
+          <a:ln>
+            <a:noFill/>
+          </a:ln>
+        </p:spPr>
+        <p:style>
+          <a:lnRef idx="2">
+            <a:schemeClr val="accent1">
+              <a:shade val="15000"/>
+            </a:schemeClr>
+          </a:lnRef>
+          <a:fillRef idx="1">
+            <a:schemeClr val="accent1"/>
+          </a:fillRef>
+          <a:effectRef idx="0">
+            <a:schemeClr val="accent1"/>
+          </a:effectRef>
+          <a:fontRef idx="minor">
+            <a:schemeClr val="lt1"/>
+          </a:fontRef>
+        </p:style>
+        <p:txBody>
+          <a:bodyPr rtlCol="0" anchor="ctr"/>
+          <a:lstStyle/>
+          <a:p>
+            <a:pPr algn="ctr"/>
+            <a:r>
+              <a:rPr kumimoji="1" lang="en-US" altLang="zh-CN" b="1" dirty="0">
+                <a:solidFill>
+                  <a:schemeClr val="tx1"/>
+                </a:solidFill>
+                <a:latin typeface="Bradley Hand" pitchFamily="2" charset="0"/>
+              </a:rPr>
+              <a:t>5</a:t>
+            </a:r>
+            <a:endParaRPr kumimoji="1" lang="zh-CN" altLang="en-US" b="1" dirty="0">
+              <a:solidFill>
+                <a:schemeClr val="tx1"/>
+              </a:solidFill>
+              <a:latin typeface="Bradley Hand" pitchFamily="2" charset="0"/>
+            </a:endParaRPr>
+          </a:p>
+        </p:txBody>
+      </p:sp>
+      <p:cxnSp>
+        <p:nvCxnSpPr>
+          <p:cNvPr id="16" name="直线箭头连接符 15">
+            <a:extLst>
+              <a:ext uri="{FF2B5EF4-FFF2-40B4-BE49-F238E27FC236}">
+                <a16:creationId xmlns:a16="http://schemas.microsoft.com/office/drawing/2014/main" id="{9AE5A3A4-6052-5791-4872-B66B572CDCFD}"/>
+              </a:ext>
+            </a:extLst>
+          </p:cNvPr>
+          <p:cNvCxnSpPr>
+            <a:stCxn id="4" idx="3"/>
+            <a:endCxn id="8" idx="1"/>
+          </p:cNvCxnSpPr>
+          <p:nvPr/>
+        </p:nvCxnSpPr>
+        <p:spPr>
+          <a:xfrm>
+            <a:off x="2211977" y="1754777"/>
+            <a:ext cx="709749" cy="0"/>
+          </a:xfrm>
+          <a:prstGeom prst="straightConnector1">
+            <a:avLst/>
+          </a:prstGeom>
+          <a:ln>
+            <a:headEnd w="med" len="lg"/>
+            <a:tailEnd type="triangle" w="med" len="lg"/>
+          </a:ln>
+        </p:spPr>
+        <p:style>
+          <a:lnRef idx="2">
+            <a:schemeClr val="accent1"/>
+          </a:lnRef>
+          <a:fillRef idx="0">
+            <a:schemeClr val="accent1"/>
+          </a:fillRef>
+          <a:effectRef idx="1">
+            <a:schemeClr val="accent1"/>
+          </a:effectRef>
+          <a:fontRef idx="minor">
+            <a:schemeClr val="tx1"/>
+          </a:fontRef>
+        </p:style>
+      </p:cxnSp>
+      <p:cxnSp>
+        <p:nvCxnSpPr>
+          <p:cNvPr id="17" name="直线箭头连接符 16">
+            <a:extLst>
+              <a:ext uri="{FF2B5EF4-FFF2-40B4-BE49-F238E27FC236}">
+                <a16:creationId xmlns:a16="http://schemas.microsoft.com/office/drawing/2014/main" id="{0C1F6D23-AE50-377A-E0D7-CADEBC16AD50}"/>
+              </a:ext>
+            </a:extLst>
+          </p:cNvPr>
+          <p:cNvCxnSpPr>
+            <a:cxnSpLocks/>
+            <a:stCxn id="5" idx="3"/>
+            <a:endCxn id="9" idx="1"/>
+          </p:cNvCxnSpPr>
+          <p:nvPr/>
+        </p:nvCxnSpPr>
+        <p:spPr>
+          <a:xfrm>
+            <a:off x="2211977" y="2094411"/>
+            <a:ext cx="709749" cy="0"/>
+          </a:xfrm>
+          <a:prstGeom prst="straightConnector1">
+            <a:avLst/>
+          </a:prstGeom>
+          <a:ln>
+            <a:headEnd w="med" len="lg"/>
+            <a:tailEnd type="triangle" w="med" len="lg"/>
+          </a:ln>
+        </p:spPr>
+        <p:style>
+          <a:lnRef idx="2">
+            <a:schemeClr val="accent1"/>
+          </a:lnRef>
+          <a:fillRef idx="0">
+            <a:schemeClr val="accent1"/>
+          </a:fillRef>
+          <a:effectRef idx="1">
+            <a:schemeClr val="accent1"/>
+          </a:effectRef>
+          <a:fontRef idx="minor">
+            <a:schemeClr val="tx1"/>
+          </a:fontRef>
+        </p:style>
+      </p:cxnSp>
+      <p:cxnSp>
+        <p:nvCxnSpPr>
+          <p:cNvPr id="20" name="直线箭头连接符 19">
+            <a:extLst>
+              <a:ext uri="{FF2B5EF4-FFF2-40B4-BE49-F238E27FC236}">
+                <a16:creationId xmlns:a16="http://schemas.microsoft.com/office/drawing/2014/main" id="{B9A5BD98-74F1-A7F4-EAD2-E2ED6A480504}"/>
+              </a:ext>
+            </a:extLst>
+          </p:cNvPr>
+          <p:cNvCxnSpPr>
+            <a:cxnSpLocks/>
+            <a:stCxn id="6" idx="3"/>
+            <a:endCxn id="10" idx="1"/>
+          </p:cNvCxnSpPr>
+          <p:nvPr/>
+        </p:nvCxnSpPr>
+        <p:spPr>
+          <a:xfrm>
+            <a:off x="2211977" y="2434045"/>
+            <a:ext cx="709749" cy="0"/>
+          </a:xfrm>
+          <a:prstGeom prst="straightConnector1">
+            <a:avLst/>
+          </a:prstGeom>
+          <a:ln>
+            <a:headEnd w="med" len="lg"/>
+            <a:tailEnd type="triangle" w="med" len="lg"/>
+          </a:ln>
+        </p:spPr>
+        <p:style>
+          <a:lnRef idx="2">
+            <a:schemeClr val="accent1"/>
+          </a:lnRef>
+          <a:fillRef idx="0">
+            <a:schemeClr val="accent1"/>
+          </a:fillRef>
+          <a:effectRef idx="1">
+            <a:schemeClr val="accent1"/>
+          </a:effectRef>
+          <a:fontRef idx="minor">
+            <a:schemeClr val="tx1"/>
+          </a:fontRef>
+        </p:style>
+      </p:cxnSp>
+      <p:cxnSp>
+        <p:nvCxnSpPr>
+          <p:cNvPr id="23" name="直线箭头连接符 22">
+            <a:extLst>
+              <a:ext uri="{FF2B5EF4-FFF2-40B4-BE49-F238E27FC236}">
+                <a16:creationId xmlns:a16="http://schemas.microsoft.com/office/drawing/2014/main" id="{B073C9BB-F1B0-9C1C-A772-6D94F46F7B1E}"/>
+              </a:ext>
+            </a:extLst>
+          </p:cNvPr>
+          <p:cNvCxnSpPr>
+            <a:cxnSpLocks/>
+            <a:stCxn id="7" idx="3"/>
+            <a:endCxn id="11" idx="1"/>
+          </p:cNvCxnSpPr>
+          <p:nvPr/>
+        </p:nvCxnSpPr>
+        <p:spPr>
+          <a:xfrm>
+            <a:off x="2211977" y="2773679"/>
+            <a:ext cx="709749" cy="0"/>
+          </a:xfrm>
+          <a:prstGeom prst="straightConnector1">
+            <a:avLst/>
+          </a:prstGeom>
+          <a:ln>
+            <a:headEnd w="med" len="lg"/>
+            <a:tailEnd type="triangle" w="med" len="lg"/>
+          </a:ln>
+        </p:spPr>
+        <p:style>
+          <a:lnRef idx="2">
+            <a:schemeClr val="accent1"/>
+          </a:lnRef>
+          <a:fillRef idx="0">
+            <a:schemeClr val="accent1"/>
+          </a:fillRef>
+          <a:effectRef idx="1">
+            <a:schemeClr val="accent1"/>
+          </a:effectRef>
+          <a:fontRef idx="minor">
+            <a:schemeClr val="tx1"/>
+          </a:fontRef>
+        </p:style>
+      </p:cxnSp>
+      <p:grpSp>
+        <p:nvGrpSpPr>
+          <p:cNvPr id="43" name="组合 42">
+            <a:extLst>
+              <a:ext uri="{FF2B5EF4-FFF2-40B4-BE49-F238E27FC236}">
+                <a16:creationId xmlns:a16="http://schemas.microsoft.com/office/drawing/2014/main" id="{12FDDDED-164F-4A19-2DC9-F5DF3192687B}"/>
+              </a:ext>
+            </a:extLst>
+          </p:cNvPr>
+          <p:cNvGrpSpPr/>
+          <p:nvPr/>
+        </p:nvGrpSpPr>
+        <p:grpSpPr>
+          <a:xfrm>
+            <a:off x="1737942" y="4560829"/>
+            <a:ext cx="2027935" cy="646331"/>
+            <a:chOff x="939853" y="4333836"/>
+            <a:chExt cx="2027935" cy="646331"/>
+          </a:xfrm>
+        </p:grpSpPr>
+        <mc:AlternateContent xmlns:mc="http://schemas.openxmlformats.org/markup-compatibility/2006">
+          <mc:Choice xmlns:a14="http://schemas.microsoft.com/office/drawing/2010/main" Requires="a14">
+            <p:sp>
+              <p:nvSpPr>
+                <p:cNvPr id="31" name="文本框 30">
+                  <a:extLst>
+                    <a:ext uri="{FF2B5EF4-FFF2-40B4-BE49-F238E27FC236}">
+                      <a16:creationId xmlns:a16="http://schemas.microsoft.com/office/drawing/2014/main" id="{9466FFAA-9B78-009C-DEAC-AE0C3607CA1C}"/>
+                    </a:ext>
+                  </a:extLst>
+                </p:cNvPr>
+                <p:cNvSpPr txBox="1"/>
+                <p:nvPr/>
+              </p:nvSpPr>
+              <p:spPr>
+                <a:xfrm>
+                  <a:off x="1234782" y="4333836"/>
+                  <a:ext cx="1733006" cy="646331"/>
+                </a:xfrm>
+                <a:prstGeom prst="rect">
+                  <a:avLst/>
+                </a:prstGeom>
+                <a:noFill/>
+              </p:spPr>
+              <p:txBody>
+                <a:bodyPr wrap="square">
+                  <a:spAutoFit/>
+                </a:bodyPr>
+                <a:lstStyle/>
+                <a:p>
+                  <a:pPr/>
+                  <a14:m>
+                    <m:oMathPara xmlns:m="http://schemas.openxmlformats.org/officeDocument/2006/math">
+                      <m:oMathParaPr>
+                        <m:jc m:val="centerGroup"/>
+                      </m:oMathParaPr>
+                      <m:oMath xmlns:m="http://schemas.openxmlformats.org/officeDocument/2006/math">
+                        <m:r>
+                          <a:rPr kumimoji="1" lang="en-US" altLang="zh-CN" sz="1800" i="1" dirty="0" smtClean="0">
+                            <a:latin typeface="Cambria Math" panose="02040503050406030204" pitchFamily="18" charset="0"/>
+                          </a:rPr>
+                          <m:t>&lt;</m:t>
+                        </m:r>
+                        <m:r>
+                          <a:rPr kumimoji="1" lang="en-US" altLang="zh-CN" sz="1800" b="1" i="1" dirty="0" smtClean="0">
+                            <a:latin typeface="Cambria Math" panose="02040503050406030204" pitchFamily="18" charset="0"/>
+                          </a:rPr>
+                          <m:t>𝟒</m:t>
+                        </m:r>
+                        <m:r>
+                          <a:rPr kumimoji="1" lang="en-US" altLang="zh-CN" sz="1800" b="1" i="1" dirty="0" smtClean="0">
+                            <a:solidFill>
+                              <a:srgbClr val="FF0000"/>
+                            </a:solidFill>
+                            <a:latin typeface="Cambria Math" panose="02040503050406030204" pitchFamily="18" charset="0"/>
+                          </a:rPr>
+                          <m:t> </m:t>
+                        </m:r>
+                        <m:r>
+                          <a:rPr kumimoji="1" lang="en-US" altLang="zh-CN" sz="1800" i="1" dirty="0" smtClean="0">
+                            <a:latin typeface="Cambria Math" panose="02040503050406030204" pitchFamily="18" charset="0"/>
+                          </a:rPr>
+                          <m:t>&gt;</m:t>
+                        </m:r>
+                      </m:oMath>
+                    </m:oMathPara>
+                  </a14:m>
+                  <a:endParaRPr kumimoji="1" lang="en-US" altLang="zh-CN" sz="1800" dirty="0"/>
+                </a:p>
+                <a:p>
+                  <a:pPr/>
+                  <a14:m>
+                    <m:oMathPara xmlns:m="http://schemas.openxmlformats.org/officeDocument/2006/math">
+                      <m:oMathParaPr>
+                        <m:jc m:val="centerGroup"/>
+                      </m:oMathParaPr>
+                      <m:oMath xmlns:m="http://schemas.openxmlformats.org/officeDocument/2006/math">
+                        <m:r>
+                          <a:rPr kumimoji="1" lang="en-US" altLang="zh-CN" sz="1800" i="1" dirty="0" smtClean="0">
+                            <a:latin typeface="Cambria Math" panose="02040503050406030204" pitchFamily="18" charset="0"/>
+                          </a:rPr>
+                          <m:t>&lt;</m:t>
+                        </m:r>
+                        <m:r>
+                          <a:rPr kumimoji="1" lang="en-US" altLang="zh-CN" sz="1800" b="1" i="1" dirty="0" smtClean="0">
+                            <a:latin typeface="Cambria Math" panose="02040503050406030204" pitchFamily="18" charset="0"/>
+                          </a:rPr>
+                          <m:t>𝟐</m:t>
+                        </m:r>
+                        <m:r>
+                          <a:rPr kumimoji="1" lang="en-US" altLang="zh-CN" sz="1800" i="1" dirty="0" smtClean="0">
+                            <a:latin typeface="Cambria Math" panose="02040503050406030204" pitchFamily="18" charset="0"/>
+                          </a:rPr>
+                          <m:t>&gt;</m:t>
+                        </m:r>
+                      </m:oMath>
+                    </m:oMathPara>
+                  </a14:m>
+                  <a:endParaRPr lang="zh-CN" altLang="en-US" dirty="0"/>
+                </a:p>
+              </p:txBody>
+            </p:sp>
+          </mc:Choice>
+          <mc:Fallback>
+            <p:sp>
+              <p:nvSpPr>
+                <p:cNvPr id="31" name="文本框 30">
+                  <a:extLst>
+                    <a:ext uri="{FF2B5EF4-FFF2-40B4-BE49-F238E27FC236}">
+                      <a16:creationId xmlns:a16="http://schemas.microsoft.com/office/drawing/2014/main" id="{9466FFAA-9B78-009C-DEAC-AE0C3607CA1C}"/>
+                    </a:ext>
+                  </a:extLst>
+                </p:cNvPr>
+                <p:cNvSpPr txBox="1">
+                  <a:spLocks noRot="1" noChangeAspect="1" noMove="1" noResize="1" noEditPoints="1" noAdjustHandles="1" noChangeArrowheads="1" noChangeShapeType="1" noTextEdit="1"/>
+                </p:cNvSpPr>
+                <p:nvPr/>
+              </p:nvSpPr>
+              <p:spPr>
+                <a:xfrm>
+                  <a:off x="1234782" y="4333836"/>
+                  <a:ext cx="1733006" cy="646331"/>
+                </a:xfrm>
+                <a:prstGeom prst="rect">
+                  <a:avLst/>
+                </a:prstGeom>
+                <a:blipFill>
+                  <a:blip r:embed="rId2"/>
+                  <a:stretch>
+                    <a:fillRect/>
+                  </a:stretch>
+                </a:blipFill>
+              </p:spPr>
+              <p:txBody>
+                <a:bodyPr/>
+                <a:lstStyle/>
+                <a:p>
+                  <a:r>
+                    <a:rPr lang="zh-CN" altLang="en-US">
+                      <a:noFill/>
+                    </a:rPr>
+                    <a:t> </a:t>
+                  </a:r>
+                </a:p>
+              </p:txBody>
+            </p:sp>
+          </mc:Fallback>
+        </mc:AlternateContent>
+        <p:sp>
+          <p:nvSpPr>
+            <p:cNvPr id="32" name="文本框 31">
+              <a:extLst>
+                <a:ext uri="{FF2B5EF4-FFF2-40B4-BE49-F238E27FC236}">
+                  <a16:creationId xmlns:a16="http://schemas.microsoft.com/office/drawing/2014/main" id="{7E8EFBB0-EB1C-9CD2-DD43-BCC923414D1D}"/>
+                </a:ext>
+              </a:extLst>
+            </p:cNvPr>
+            <p:cNvSpPr txBox="1"/>
+            <p:nvPr/>
+          </p:nvSpPr>
+          <p:spPr>
+            <a:xfrm>
+              <a:off x="939853" y="4368291"/>
+              <a:ext cx="1132786" cy="369332"/>
+            </a:xfrm>
+            <a:prstGeom prst="rect">
+              <a:avLst/>
+            </a:prstGeom>
+            <a:noFill/>
+          </p:spPr>
+          <p:txBody>
+            <a:bodyPr wrap="square" rtlCol="0">
+              <a:spAutoFit/>
+            </a:bodyPr>
+            <a:lstStyle/>
+            <a:p>
+              <a:r>
+                <a:rPr kumimoji="1" lang="en-US" altLang="zh-CN" dirty="0">
+                  <a:latin typeface="Bradley Hand" pitchFamily="2" charset="0"/>
+                </a:rPr>
+                <a:t>layout</a:t>
+              </a:r>
+              <a:endParaRPr kumimoji="1" lang="zh-CN" altLang="en-US" dirty="0">
+                <a:latin typeface="Bradley Hand" pitchFamily="2" charset="0"/>
+              </a:endParaRPr>
+            </a:p>
+          </p:txBody>
+        </p:sp>
+      </p:grpSp>
+      <p:sp>
+        <p:nvSpPr>
+          <p:cNvPr id="35" name="椭圆 34">
+            <a:extLst>
+              <a:ext uri="{FF2B5EF4-FFF2-40B4-BE49-F238E27FC236}">
+                <a16:creationId xmlns:a16="http://schemas.microsoft.com/office/drawing/2014/main" id="{71994127-936B-27CA-8CFF-A2CB324D1309}"/>
+              </a:ext>
+            </a:extLst>
+          </p:cNvPr>
+          <p:cNvSpPr/>
+          <p:nvPr/>
+        </p:nvSpPr>
+        <p:spPr>
+          <a:xfrm>
+            <a:off x="2737588" y="4063499"/>
+            <a:ext cx="698047" cy="252539"/>
+          </a:xfrm>
+          <a:prstGeom prst="ellipse">
+            <a:avLst/>
+          </a:prstGeom>
+          <a:solidFill>
+            <a:schemeClr val="accent5">
+              <a:lumMod val="20000"/>
+              <a:lumOff val="80000"/>
+            </a:schemeClr>
+          </a:solidFill>
+          <a:ln>
+            <a:solidFill>
+              <a:schemeClr val="accent5">
+                <a:lumMod val="75000"/>
+              </a:schemeClr>
+            </a:solidFill>
+          </a:ln>
+        </p:spPr>
+        <p:style>
+          <a:lnRef idx="2">
+            <a:schemeClr val="accent1">
+              <a:shade val="15000"/>
+            </a:schemeClr>
+          </a:lnRef>
+          <a:fillRef idx="1">
+            <a:schemeClr val="accent1"/>
+          </a:fillRef>
+          <a:effectRef idx="0">
+            <a:schemeClr val="accent1"/>
+          </a:effectRef>
+          <a:fontRef idx="minor">
+            <a:schemeClr val="lt1"/>
+          </a:fontRef>
+        </p:style>
+        <p:txBody>
+          <a:bodyPr rtlCol="0" anchor="ctr"/>
+          <a:lstStyle/>
+          <a:p>
+            <a:pPr algn="ctr"/>
+            <a:endParaRPr kumimoji="1" lang="zh-CN" altLang="en-US"/>
+          </a:p>
+        </p:txBody>
+      </p:sp>
+      <p:grpSp>
+        <p:nvGrpSpPr>
+          <p:cNvPr id="41" name="组合 40">
+            <a:extLst>
+              <a:ext uri="{FF2B5EF4-FFF2-40B4-BE49-F238E27FC236}">
+                <a16:creationId xmlns:a16="http://schemas.microsoft.com/office/drawing/2014/main" id="{F5624CA4-B95E-981F-E9C5-67B49F2BDE1F}"/>
+              </a:ext>
+            </a:extLst>
+          </p:cNvPr>
+          <p:cNvGrpSpPr/>
+          <p:nvPr/>
+        </p:nvGrpSpPr>
+        <p:grpSpPr>
+          <a:xfrm>
+            <a:off x="844729" y="1031804"/>
+            <a:ext cx="1706882" cy="369332"/>
+            <a:chOff x="4245428" y="1589716"/>
+            <a:chExt cx="1706882" cy="369332"/>
+          </a:xfrm>
+        </p:grpSpPr>
+        <p:sp>
+          <p:nvSpPr>
+            <p:cNvPr id="33" name="椭圆 32">
+              <a:extLst>
+                <a:ext uri="{FF2B5EF4-FFF2-40B4-BE49-F238E27FC236}">
+                  <a16:creationId xmlns:a16="http://schemas.microsoft.com/office/drawing/2014/main" id="{102E6737-C124-E1BA-B370-3375C43D7130}"/>
+                </a:ext>
+              </a:extLst>
+            </p:cNvPr>
+            <p:cNvSpPr/>
+            <p:nvPr/>
+          </p:nvSpPr>
+          <p:spPr>
+            <a:xfrm flipV="1">
+              <a:off x="4245428" y="1624172"/>
+              <a:ext cx="714105" cy="300421"/>
+            </a:xfrm>
+            <a:prstGeom prst="ellipse">
+              <a:avLst/>
+            </a:prstGeom>
+            <a:solidFill>
+              <a:schemeClr val="tx2">
+                <a:lumMod val="10000"/>
+                <a:lumOff val="90000"/>
+              </a:schemeClr>
+            </a:solidFill>
+          </p:spPr>
+          <p:style>
+            <a:lnRef idx="2">
+              <a:schemeClr val="accent1">
+                <a:shade val="15000"/>
+              </a:schemeClr>
+            </a:lnRef>
+            <a:fillRef idx="1">
+              <a:schemeClr val="accent1"/>
+            </a:fillRef>
+            <a:effectRef idx="0">
+              <a:schemeClr val="accent1"/>
+            </a:effectRef>
+            <a:fontRef idx="minor">
+              <a:schemeClr val="lt1"/>
+            </a:fontRef>
+          </p:style>
+          <p:txBody>
+            <a:bodyPr rtlCol="0" anchor="ctr"/>
+            <a:lstStyle/>
+            <a:p>
+              <a:pPr algn="ctr"/>
+              <a:endParaRPr kumimoji="1" lang="zh-CN" altLang="en-US" dirty="0"/>
+            </a:p>
+          </p:txBody>
+        </p:sp>
+        <p:sp>
+          <p:nvSpPr>
+            <p:cNvPr id="36" name="文本框 35">
+              <a:extLst>
+                <a:ext uri="{FF2B5EF4-FFF2-40B4-BE49-F238E27FC236}">
+                  <a16:creationId xmlns:a16="http://schemas.microsoft.com/office/drawing/2014/main" id="{84DBDF0D-0580-0457-1D35-914B6962C4A8}"/>
+                </a:ext>
+              </a:extLst>
+            </p:cNvPr>
+            <p:cNvSpPr txBox="1"/>
+            <p:nvPr/>
+          </p:nvSpPr>
+          <p:spPr>
+            <a:xfrm>
+              <a:off x="4959533" y="1589716"/>
+              <a:ext cx="992777" cy="369332"/>
+            </a:xfrm>
+            <a:prstGeom prst="rect">
+              <a:avLst/>
+            </a:prstGeom>
+            <a:noFill/>
+          </p:spPr>
+          <p:txBody>
+            <a:bodyPr wrap="square" rtlCol="0">
+              <a:spAutoFit/>
+            </a:bodyPr>
+            <a:lstStyle/>
+            <a:p>
+              <a:r>
+                <a:rPr kumimoji="1" lang="en-US" altLang="zh-CN" dirty="0">
+                  <a:solidFill>
+                    <a:srgbClr val="00B0F0"/>
+                  </a:solidFill>
+                  <a:latin typeface="Bradley Hand" pitchFamily="2" charset="0"/>
+                </a:rPr>
+                <a:t>domain</a:t>
+              </a:r>
+              <a:endParaRPr kumimoji="1" lang="zh-CN" altLang="en-US" dirty="0">
+                <a:solidFill>
+                  <a:srgbClr val="00B0F0"/>
+                </a:solidFill>
+                <a:latin typeface="Bradley Hand" pitchFamily="2" charset="0"/>
+              </a:endParaRPr>
+            </a:p>
+          </p:txBody>
+        </p:sp>
+      </p:grpSp>
+      <p:grpSp>
+        <p:nvGrpSpPr>
+          <p:cNvPr id="42" name="组合 41">
+            <a:extLst>
+              <a:ext uri="{FF2B5EF4-FFF2-40B4-BE49-F238E27FC236}">
+                <a16:creationId xmlns:a16="http://schemas.microsoft.com/office/drawing/2014/main" id="{50E590E9-3C08-C85B-904B-1D1588752722}"/>
+              </a:ext>
+            </a:extLst>
+          </p:cNvPr>
+          <p:cNvGrpSpPr/>
+          <p:nvPr/>
+        </p:nvGrpSpPr>
+        <p:grpSpPr>
+          <a:xfrm>
+            <a:off x="2751910" y="1014386"/>
+            <a:ext cx="1493517" cy="369332"/>
+            <a:chOff x="2751910" y="1014386"/>
+            <a:chExt cx="1493517" cy="369332"/>
+          </a:xfrm>
+        </p:grpSpPr>
+        <p:sp>
+          <p:nvSpPr>
+            <p:cNvPr id="34" name="椭圆 33">
+              <a:extLst>
+                <a:ext uri="{FF2B5EF4-FFF2-40B4-BE49-F238E27FC236}">
+                  <a16:creationId xmlns:a16="http://schemas.microsoft.com/office/drawing/2014/main" id="{98A80D10-1D8C-B23F-AAA0-EB7715DAC7E4}"/>
+                </a:ext>
+              </a:extLst>
+            </p:cNvPr>
+            <p:cNvSpPr/>
+            <p:nvPr/>
+          </p:nvSpPr>
+          <p:spPr>
+            <a:xfrm>
+              <a:off x="3531322" y="1090201"/>
+              <a:ext cx="714105" cy="252538"/>
+            </a:xfrm>
+            <a:prstGeom prst="ellipse">
+              <a:avLst/>
+            </a:prstGeom>
+            <a:solidFill>
+              <a:schemeClr val="accent2">
+                <a:lumMod val="20000"/>
+                <a:lumOff val="80000"/>
+              </a:schemeClr>
+            </a:solidFill>
+            <a:ln>
+              <a:solidFill>
+                <a:schemeClr val="accent2">
+                  <a:lumMod val="75000"/>
+                </a:schemeClr>
+              </a:solidFill>
+            </a:ln>
+          </p:spPr>
+          <p:style>
+            <a:lnRef idx="2">
+              <a:schemeClr val="accent1">
+                <a:shade val="15000"/>
+              </a:schemeClr>
+            </a:lnRef>
+            <a:fillRef idx="1">
+              <a:schemeClr val="accent1"/>
+            </a:fillRef>
+            <a:effectRef idx="0">
+              <a:schemeClr val="accent1"/>
+            </a:effectRef>
+            <a:fontRef idx="minor">
+              <a:schemeClr val="lt1"/>
+            </a:fontRef>
+          </p:style>
+          <p:txBody>
+            <a:bodyPr rtlCol="0" anchor="ctr"/>
+            <a:lstStyle/>
+            <a:p>
+              <a:pPr algn="ctr"/>
+              <a:endParaRPr kumimoji="1" lang="zh-CN" altLang="en-US"/>
+            </a:p>
+          </p:txBody>
+        </p:sp>
+        <p:sp>
+          <p:nvSpPr>
+            <p:cNvPr id="37" name="文本框 36">
+              <a:extLst>
+                <a:ext uri="{FF2B5EF4-FFF2-40B4-BE49-F238E27FC236}">
+                  <a16:creationId xmlns:a16="http://schemas.microsoft.com/office/drawing/2014/main" id="{19DF87A8-C221-114E-A4F9-60CF018519B4}"/>
+                </a:ext>
+              </a:extLst>
+            </p:cNvPr>
+            <p:cNvSpPr txBox="1"/>
+            <p:nvPr/>
+          </p:nvSpPr>
+          <p:spPr>
+            <a:xfrm>
+              <a:off x="2751910" y="1014386"/>
+              <a:ext cx="992777" cy="369332"/>
+            </a:xfrm>
+            <a:prstGeom prst="rect">
+              <a:avLst/>
+            </a:prstGeom>
+            <a:noFill/>
+          </p:spPr>
+          <p:txBody>
+            <a:bodyPr wrap="square" rtlCol="0">
+              <a:spAutoFit/>
+            </a:bodyPr>
+            <a:lstStyle/>
+            <a:p>
+              <a:r>
+                <a:rPr kumimoji="1" lang="en-US" altLang="zh-CN" dirty="0">
+                  <a:solidFill>
+                    <a:srgbClr val="FF0000"/>
+                  </a:solidFill>
+                  <a:latin typeface="Bradley Hand" pitchFamily="2" charset="0"/>
+                </a:rPr>
+                <a:t>range</a:t>
+              </a:r>
+              <a:endParaRPr kumimoji="1" lang="zh-CN" altLang="en-US" dirty="0">
+                <a:solidFill>
+                  <a:srgbClr val="FF0000"/>
+                </a:solidFill>
+                <a:latin typeface="Bradley Hand" pitchFamily="2" charset="0"/>
+              </a:endParaRPr>
+            </a:p>
+          </p:txBody>
+        </p:sp>
+      </p:grpSp>
+      <p:sp>
+        <p:nvSpPr>
+          <p:cNvPr id="38" name="文本框 37">
+            <a:extLst>
+              <a:ext uri="{FF2B5EF4-FFF2-40B4-BE49-F238E27FC236}">
+                <a16:creationId xmlns:a16="http://schemas.microsoft.com/office/drawing/2014/main" id="{664AEF17-0DAA-C970-5EF0-D08CAE69F05C}"/>
+              </a:ext>
+            </a:extLst>
+          </p:cNvPr>
+          <p:cNvSpPr txBox="1"/>
+          <p:nvPr/>
+        </p:nvSpPr>
+        <p:spPr>
+          <a:xfrm>
+            <a:off x="3451693" y="4019953"/>
+            <a:ext cx="1267097" cy="369332"/>
+          </a:xfrm>
+          <a:prstGeom prst="rect">
+            <a:avLst/>
+          </a:prstGeom>
+          <a:noFill/>
+        </p:spPr>
+        <p:txBody>
+          <a:bodyPr wrap="square" rtlCol="0">
+            <a:spAutoFit/>
+          </a:bodyPr>
+          <a:lstStyle/>
+          <a:p>
+            <a:r>
+              <a:rPr kumimoji="1" lang="en-US" altLang="zh-CN" dirty="0">
+                <a:latin typeface="Bradley Hand" pitchFamily="2" charset="0"/>
+              </a:rPr>
+              <a:t>codomain</a:t>
+            </a:r>
+            <a:endParaRPr kumimoji="1" lang="zh-CN" altLang="en-US" dirty="0">
+              <a:latin typeface="Bradley Hand" pitchFamily="2" charset="0"/>
+            </a:endParaRPr>
+          </a:p>
+        </p:txBody>
+      </p:sp>
+      <p:sp>
+        <p:nvSpPr>
+          <p:cNvPr id="39" name="文本框 38">
+            <a:extLst>
+              <a:ext uri="{FF2B5EF4-FFF2-40B4-BE49-F238E27FC236}">
+                <a16:creationId xmlns:a16="http://schemas.microsoft.com/office/drawing/2014/main" id="{384823B1-EBDD-FE56-C386-7B0A1AF7B507}"/>
+              </a:ext>
+            </a:extLst>
+          </p:cNvPr>
+          <p:cNvSpPr txBox="1"/>
+          <p:nvPr/>
+        </p:nvSpPr>
+        <p:spPr>
+          <a:xfrm>
+            <a:off x="1069225" y="385090"/>
+            <a:ext cx="1668363" cy="646331"/>
+          </a:xfrm>
+          <a:prstGeom prst="rect">
+            <a:avLst/>
+          </a:prstGeom>
+          <a:noFill/>
+        </p:spPr>
+        <p:txBody>
+          <a:bodyPr wrap="square" rtlCol="0">
+            <a:spAutoFit/>
+          </a:bodyPr>
+          <a:lstStyle/>
+          <a:p>
+            <a:r>
+              <a:rPr kumimoji="1" lang="en-US" altLang="zh-CN" dirty="0">
+                <a:solidFill>
+                  <a:srgbClr val="00B0F0"/>
+                </a:solidFill>
+                <a:latin typeface="Bradley Hand" pitchFamily="2" charset="0"/>
+              </a:rPr>
+              <a:t>Logical</a:t>
+            </a:r>
+          </a:p>
+          <a:p>
+            <a:r>
+              <a:rPr kumimoji="1" lang="en-US" altLang="zh-CN" dirty="0">
+                <a:solidFill>
+                  <a:srgbClr val="00B0F0"/>
+                </a:solidFill>
+                <a:latin typeface="Bradley Hand" pitchFamily="2" charset="0"/>
+              </a:rPr>
+              <a:t>1-D</a:t>
+            </a:r>
+            <a:r>
+              <a:rPr kumimoji="1" lang="zh-CN" altLang="en-US" dirty="0">
+                <a:solidFill>
+                  <a:srgbClr val="00B0F0"/>
+                </a:solidFill>
+                <a:latin typeface="Bradley Hand" pitchFamily="2" charset="0"/>
+              </a:rPr>
+              <a:t> </a:t>
+            </a:r>
+            <a:r>
+              <a:rPr kumimoji="1" lang="en-US" altLang="zh-CN" dirty="0">
+                <a:solidFill>
+                  <a:srgbClr val="00B0F0"/>
+                </a:solidFill>
+                <a:latin typeface="Bradley Hand" pitchFamily="2" charset="0"/>
+              </a:rPr>
+              <a:t>coordinate</a:t>
+            </a:r>
+            <a:endParaRPr kumimoji="1" lang="zh-CN" altLang="en-US" dirty="0">
+              <a:solidFill>
+                <a:srgbClr val="00B0F0"/>
+              </a:solidFill>
+              <a:latin typeface="Bradley Hand" pitchFamily="2" charset="0"/>
+            </a:endParaRPr>
+          </a:p>
+        </p:txBody>
+      </p:sp>
+      <p:sp>
+        <p:nvSpPr>
+          <p:cNvPr id="40" name="文本框 39">
+            <a:extLst>
+              <a:ext uri="{FF2B5EF4-FFF2-40B4-BE49-F238E27FC236}">
+                <a16:creationId xmlns:a16="http://schemas.microsoft.com/office/drawing/2014/main" id="{7453CF4B-DB42-91F2-AA2A-22CD9595EDB5}"/>
+              </a:ext>
+            </a:extLst>
+          </p:cNvPr>
+          <p:cNvSpPr txBox="1"/>
+          <p:nvPr/>
+        </p:nvSpPr>
+        <p:spPr>
+          <a:xfrm>
+            <a:off x="2737588" y="642947"/>
+            <a:ext cx="1169463" cy="369332"/>
+          </a:xfrm>
+          <a:prstGeom prst="rect">
+            <a:avLst/>
+          </a:prstGeom>
+          <a:noFill/>
+        </p:spPr>
+        <p:txBody>
+          <a:bodyPr wrap="square" rtlCol="0">
+            <a:spAutoFit/>
+          </a:bodyPr>
+          <a:lstStyle/>
+          <a:p>
+            <a:r>
+              <a:rPr kumimoji="1" lang="en-US" altLang="zh-CN" dirty="0">
+                <a:solidFill>
+                  <a:srgbClr val="FF0000"/>
+                </a:solidFill>
+                <a:latin typeface="Bradley Hand" pitchFamily="2" charset="0"/>
+              </a:rPr>
+              <a:t>1-D</a:t>
+            </a:r>
+            <a:r>
+              <a:rPr kumimoji="1" lang="zh-CN" altLang="en-US" dirty="0">
+                <a:solidFill>
+                  <a:srgbClr val="FF0000"/>
+                </a:solidFill>
+                <a:latin typeface="Bradley Hand" pitchFamily="2" charset="0"/>
+              </a:rPr>
+              <a:t> </a:t>
+            </a:r>
+            <a:r>
+              <a:rPr kumimoji="1" lang="en-US" altLang="zh-CN" dirty="0">
+                <a:solidFill>
+                  <a:srgbClr val="FF0000"/>
+                </a:solidFill>
+                <a:latin typeface="Bradley Hand" pitchFamily="2" charset="0"/>
+              </a:rPr>
+              <a:t>index</a:t>
+            </a:r>
+            <a:endParaRPr kumimoji="1" lang="zh-CN" altLang="en-US" dirty="0">
+              <a:solidFill>
+                <a:srgbClr val="FF0000"/>
+              </a:solidFill>
+              <a:latin typeface="Bradley Hand" pitchFamily="2" charset="0"/>
+            </a:endParaRPr>
+          </a:p>
+        </p:txBody>
+      </p:sp>
+    </p:spTree>
+    <p:extLst>
+      <p:ext uri="{BB962C8B-B14F-4D97-AF65-F5344CB8AC3E}">
+        <p14:creationId xmlns:p14="http://schemas.microsoft.com/office/powerpoint/2010/main" val="3322283632"/>
+      </p:ext>
+    </p:extLst>
+  </p:cSld>
+  <p:clrMapOvr>
+    <a:masterClrMapping/>
+  </p:clrMapOvr>
+</p:sld>
+</file>
+
 <file path=ppt/theme/theme1.xml><?xml version="1.0" encoding="utf-8"?>
 <a:theme xmlns:a="http://schemas.openxmlformats.org/drawingml/2006/main" name="Office 主题​​">
   <a:themeElements>

</xml_diff>

<commit_message>
<fix>: bug fix. (#23)
* bug fix.

* clean.

---------

Co-authored-by: lcy-seso <lcy-seso@gmail.com>
</commit_message>
<xml_diff>
--- a/Cuda/cute/layout/figures/figures.pptx
+++ b/Cuda/cute/layout/figures/figures.pptx
@@ -5,11 +5,12 @@
     <p:sldMasterId id="2147483648" r:id="rId1"/>
   </p:sldMasterIdLst>
   <p:notesMasterIdLst>
-    <p:notesMasterId r:id="rId4"/>
+    <p:notesMasterId r:id="rId5"/>
   </p:notesMasterIdLst>
   <p:sldIdLst>
     <p:sldId id="256" r:id="rId2"/>
     <p:sldId id="257" r:id="rId3"/>
+    <p:sldId id="258" r:id="rId4"/>
   </p:sldIdLst>
   <p:sldSz cx="12192000" cy="6858000"/>
   <p:notesSz cx="6858000" cy="9144000"/>
@@ -209,7 +210,7 @@
           <a:p>
             <a:fld id="{A47AB2A2-815D-EF45-AF69-1D82858C2DA2}" type="datetimeFigureOut">
               <a:rPr kumimoji="1" lang="zh-CN" altLang="en-US" smtClean="0"/>
-              <a:t>2023/10/7</a:t>
+              <a:t>2023/12/1</a:t>
             </a:fld>
             <a:endParaRPr kumimoji="1" lang="zh-CN" altLang="en-US"/>
           </a:p>
@@ -707,7 +708,7 @@
           <a:p>
             <a:fld id="{446450CF-2172-2D43-A064-4BA9DA7DFF0D}" type="datetimeFigureOut">
               <a:rPr kumimoji="1" lang="zh-CN" altLang="en-US" smtClean="0"/>
-              <a:t>2023/10/7</a:t>
+              <a:t>2023/12/1</a:t>
             </a:fld>
             <a:endParaRPr kumimoji="1" lang="zh-CN" altLang="en-US"/>
           </a:p>
@@ -905,7 +906,7 @@
           <a:p>
             <a:fld id="{446450CF-2172-2D43-A064-4BA9DA7DFF0D}" type="datetimeFigureOut">
               <a:rPr kumimoji="1" lang="zh-CN" altLang="en-US" smtClean="0"/>
-              <a:t>2023/10/7</a:t>
+              <a:t>2023/12/1</a:t>
             </a:fld>
             <a:endParaRPr kumimoji="1" lang="zh-CN" altLang="en-US"/>
           </a:p>
@@ -1113,7 +1114,7 @@
           <a:p>
             <a:fld id="{446450CF-2172-2D43-A064-4BA9DA7DFF0D}" type="datetimeFigureOut">
               <a:rPr kumimoji="1" lang="zh-CN" altLang="en-US" smtClean="0"/>
-              <a:t>2023/10/7</a:t>
+              <a:t>2023/12/1</a:t>
             </a:fld>
             <a:endParaRPr kumimoji="1" lang="zh-CN" altLang="en-US"/>
           </a:p>
@@ -1311,7 +1312,7 @@
           <a:p>
             <a:fld id="{446450CF-2172-2D43-A064-4BA9DA7DFF0D}" type="datetimeFigureOut">
               <a:rPr kumimoji="1" lang="zh-CN" altLang="en-US" smtClean="0"/>
-              <a:t>2023/10/7</a:t>
+              <a:t>2023/12/1</a:t>
             </a:fld>
             <a:endParaRPr kumimoji="1" lang="zh-CN" altLang="en-US"/>
           </a:p>
@@ -1586,7 +1587,7 @@
           <a:p>
             <a:fld id="{446450CF-2172-2D43-A064-4BA9DA7DFF0D}" type="datetimeFigureOut">
               <a:rPr kumimoji="1" lang="zh-CN" altLang="en-US" smtClean="0"/>
-              <a:t>2023/10/7</a:t>
+              <a:t>2023/12/1</a:t>
             </a:fld>
             <a:endParaRPr kumimoji="1" lang="zh-CN" altLang="en-US"/>
           </a:p>
@@ -1851,7 +1852,7 @@
           <a:p>
             <a:fld id="{446450CF-2172-2D43-A064-4BA9DA7DFF0D}" type="datetimeFigureOut">
               <a:rPr kumimoji="1" lang="zh-CN" altLang="en-US" smtClean="0"/>
-              <a:t>2023/10/7</a:t>
+              <a:t>2023/12/1</a:t>
             </a:fld>
             <a:endParaRPr kumimoji="1" lang="zh-CN" altLang="en-US"/>
           </a:p>
@@ -2263,7 +2264,7 @@
           <a:p>
             <a:fld id="{446450CF-2172-2D43-A064-4BA9DA7DFF0D}" type="datetimeFigureOut">
               <a:rPr kumimoji="1" lang="zh-CN" altLang="en-US" smtClean="0"/>
-              <a:t>2023/10/7</a:t>
+              <a:t>2023/12/1</a:t>
             </a:fld>
             <a:endParaRPr kumimoji="1" lang="zh-CN" altLang="en-US"/>
           </a:p>
@@ -2404,7 +2405,7 @@
           <a:p>
             <a:fld id="{446450CF-2172-2D43-A064-4BA9DA7DFF0D}" type="datetimeFigureOut">
               <a:rPr kumimoji="1" lang="zh-CN" altLang="en-US" smtClean="0"/>
-              <a:t>2023/10/7</a:t>
+              <a:t>2023/12/1</a:t>
             </a:fld>
             <a:endParaRPr kumimoji="1" lang="zh-CN" altLang="en-US"/>
           </a:p>
@@ -2517,7 +2518,7 @@
           <a:p>
             <a:fld id="{446450CF-2172-2D43-A064-4BA9DA7DFF0D}" type="datetimeFigureOut">
               <a:rPr kumimoji="1" lang="zh-CN" altLang="en-US" smtClean="0"/>
-              <a:t>2023/10/7</a:t>
+              <a:t>2023/12/1</a:t>
             </a:fld>
             <a:endParaRPr kumimoji="1" lang="zh-CN" altLang="en-US"/>
           </a:p>
@@ -2828,7 +2829,7 @@
           <a:p>
             <a:fld id="{446450CF-2172-2D43-A064-4BA9DA7DFF0D}" type="datetimeFigureOut">
               <a:rPr kumimoji="1" lang="zh-CN" altLang="en-US" smtClean="0"/>
-              <a:t>2023/10/7</a:t>
+              <a:t>2023/12/1</a:t>
             </a:fld>
             <a:endParaRPr kumimoji="1" lang="zh-CN" altLang="en-US"/>
           </a:p>
@@ -3116,7 +3117,7 @@
           <a:p>
             <a:fld id="{446450CF-2172-2D43-A064-4BA9DA7DFF0D}" type="datetimeFigureOut">
               <a:rPr kumimoji="1" lang="zh-CN" altLang="en-US" smtClean="0"/>
-              <a:t>2023/10/7</a:t>
+              <a:t>2023/12/1</a:t>
             </a:fld>
             <a:endParaRPr kumimoji="1" lang="zh-CN" altLang="en-US"/>
           </a:p>
@@ -3357,7 +3358,7 @@
           <a:p>
             <a:fld id="{446450CF-2172-2D43-A064-4BA9DA7DFF0D}" type="datetimeFigureOut">
               <a:rPr kumimoji="1" lang="zh-CN" altLang="en-US" smtClean="0"/>
-              <a:t>2023/10/7</a:t>
+              <a:t>2023/12/1</a:t>
             </a:fld>
             <a:endParaRPr kumimoji="1" lang="zh-CN" altLang="en-US"/>
           </a:p>
@@ -10745,8 +10746,8 @@
             <a:chExt cx="2027935" cy="646331"/>
           </a:xfrm>
         </p:grpSpPr>
-        <mc:AlternateContent xmlns:mc="http://schemas.openxmlformats.org/markup-compatibility/2006">
-          <mc:Choice xmlns:a14="http://schemas.microsoft.com/office/drawing/2010/main" Requires="a14">
+        <mc:AlternateContent xmlns:mc="http://schemas.openxmlformats.org/markup-compatibility/2006" xmlns:a14="http://schemas.microsoft.com/office/drawing/2010/main">
+          <mc:Choice Requires="a14">
             <p:sp>
               <p:nvSpPr>
                 <p:cNvPr id="31" name="文本框 30">
@@ -10848,7 +10849,7 @@
               </p:txBody>
             </p:sp>
           </mc:Choice>
-          <mc:Fallback>
+          <mc:Fallback xmlns="">
             <p:sp>
               <p:nvSpPr>
                 <p:cNvPr id="31" name="文本框 30">
@@ -11421,6 +11422,643 @@
     <p:extLst>
       <p:ext uri="{BB962C8B-B14F-4D97-AF65-F5344CB8AC3E}">
         <p14:creationId xmlns:p14="http://schemas.microsoft.com/office/powerpoint/2010/main" val="3322283632"/>
+      </p:ext>
+    </p:extLst>
+  </p:cSld>
+  <p:clrMapOvr>
+    <a:masterClrMapping/>
+  </p:clrMapOvr>
+</p:sld>
+</file>
+
+<file path=ppt/slides/slide3.xml><?xml version="1.0" encoding="utf-8"?>
+<p:sld xmlns:a="http://schemas.openxmlformats.org/drawingml/2006/main" xmlns:r="http://schemas.openxmlformats.org/officeDocument/2006/relationships" xmlns:p="http://schemas.openxmlformats.org/presentationml/2006/main">
+  <p:cSld>
+    <p:spTree>
+      <p:nvGrpSpPr>
+        <p:cNvPr id="1" name=""/>
+        <p:cNvGrpSpPr/>
+        <p:nvPr/>
+      </p:nvGrpSpPr>
+      <p:grpSpPr>
+        <a:xfrm>
+          <a:off x="0" y="0"/>
+          <a:ext cx="0" cy="0"/>
+          <a:chOff x="0" y="0"/>
+          <a:chExt cx="0" cy="0"/>
+        </a:xfrm>
+      </p:grpSpPr>
+      <p:graphicFrame>
+        <p:nvGraphicFramePr>
+          <p:cNvPr id="2" name="表格 1">
+            <a:extLst>
+              <a:ext uri="{FF2B5EF4-FFF2-40B4-BE49-F238E27FC236}">
+                <a16:creationId xmlns:a16="http://schemas.microsoft.com/office/drawing/2014/main" id="{E505D510-A121-D0FA-D228-5D0A801F3026}"/>
+              </a:ext>
+            </a:extLst>
+          </p:cNvPr>
+          <p:cNvGraphicFramePr>
+            <a:graphicFrameLocks noGrp="1"/>
+          </p:cNvGraphicFramePr>
+          <p:nvPr>
+            <p:extLst>
+              <p:ext uri="{D42A27DB-BD31-4B8C-83A1-F6EECF244321}">
+                <p14:modId xmlns:p14="http://schemas.microsoft.com/office/powerpoint/2010/main" val="2991609184"/>
+              </p:ext>
+            </p:extLst>
+          </p:nvPr>
+        </p:nvGraphicFramePr>
+        <p:xfrm>
+          <a:off x="3651794" y="2108422"/>
+          <a:ext cx="1730104" cy="1097280"/>
+        </p:xfrm>
+        <a:graphic>
+          <a:graphicData uri="http://schemas.openxmlformats.org/drawingml/2006/table">
+            <a:tbl>
+              <a:tblPr firstRow="1" bandRow="1">
+                <a:tableStyleId>{5940675A-B579-460E-94D1-54222C63F5DA}</a:tableStyleId>
+              </a:tblPr>
+              <a:tblGrid>
+                <a:gridCol w="432526">
+                  <a:extLst>
+                    <a:ext uri="{9D8B030D-6E8A-4147-A177-3AD203B41FA5}">
+                      <a16:colId xmlns:a16="http://schemas.microsoft.com/office/drawing/2014/main" val="105313018"/>
+                    </a:ext>
+                  </a:extLst>
+                </a:gridCol>
+                <a:gridCol w="432526">
+                  <a:extLst>
+                    <a:ext uri="{9D8B030D-6E8A-4147-A177-3AD203B41FA5}">
+                      <a16:colId xmlns:a16="http://schemas.microsoft.com/office/drawing/2014/main" val="437249717"/>
+                    </a:ext>
+                  </a:extLst>
+                </a:gridCol>
+                <a:gridCol w="432526">
+                  <a:extLst>
+                    <a:ext uri="{9D8B030D-6E8A-4147-A177-3AD203B41FA5}">
+                      <a16:colId xmlns:a16="http://schemas.microsoft.com/office/drawing/2014/main" val="4275329796"/>
+                    </a:ext>
+                  </a:extLst>
+                </a:gridCol>
+                <a:gridCol w="432526">
+                  <a:extLst>
+                    <a:ext uri="{9D8B030D-6E8A-4147-A177-3AD203B41FA5}">
+                      <a16:colId xmlns:a16="http://schemas.microsoft.com/office/drawing/2014/main" val="1988940769"/>
+                    </a:ext>
+                  </a:extLst>
+                </a:gridCol>
+              </a:tblGrid>
+              <a:tr h="172317">
+                <a:tc>
+                  <a:txBody>
+                    <a:bodyPr/>
+                    <a:lstStyle/>
+                    <a:p>
+                      <a:endParaRPr lang="zh-CN" altLang="en-US" dirty="0">
+                        <a:latin typeface="Bradley Hand" pitchFamily="2" charset="0"/>
+                      </a:endParaRPr>
+                    </a:p>
+                  </a:txBody>
+                  <a:tcPr>
+                    <a:solidFill>
+                      <a:schemeClr val="bg1"/>
+                    </a:solidFill>
+                  </a:tcPr>
+                </a:tc>
+                <a:tc>
+                  <a:txBody>
+                    <a:bodyPr/>
+                    <a:lstStyle/>
+                    <a:p>
+                      <a:r>
+                        <a:rPr lang="en-US" altLang="zh-CN" b="1" dirty="0">
+                          <a:latin typeface="Bradley Hand" pitchFamily="2" charset="0"/>
+                        </a:rPr>
+                        <a:t>0</a:t>
+                      </a:r>
+                      <a:endParaRPr lang="zh-CN" altLang="en-US" b="1" dirty="0">
+                        <a:latin typeface="Bradley Hand" pitchFamily="2" charset="0"/>
+                      </a:endParaRPr>
+                    </a:p>
+                  </a:txBody>
+                  <a:tcPr>
+                    <a:solidFill>
+                      <a:schemeClr val="accent6">
+                        <a:lumMod val="20000"/>
+                        <a:lumOff val="80000"/>
+                      </a:schemeClr>
+                    </a:solidFill>
+                  </a:tcPr>
+                </a:tc>
+                <a:tc>
+                  <a:txBody>
+                    <a:bodyPr/>
+                    <a:lstStyle/>
+                    <a:p>
+                      <a:r>
+                        <a:rPr lang="en-US" altLang="zh-CN" b="1" dirty="0">
+                          <a:latin typeface="Bradley Hand" pitchFamily="2" charset="0"/>
+                        </a:rPr>
+                        <a:t>1</a:t>
+                      </a:r>
+                      <a:endParaRPr lang="zh-CN" altLang="en-US" b="1" dirty="0">
+                        <a:latin typeface="Bradley Hand" pitchFamily="2" charset="0"/>
+                      </a:endParaRPr>
+                    </a:p>
+                  </a:txBody>
+                  <a:tcPr>
+                    <a:solidFill>
+                      <a:schemeClr val="accent6">
+                        <a:lumMod val="20000"/>
+                        <a:lumOff val="80000"/>
+                      </a:schemeClr>
+                    </a:solidFill>
+                  </a:tcPr>
+                </a:tc>
+                <a:tc>
+                  <a:txBody>
+                    <a:bodyPr/>
+                    <a:lstStyle/>
+                    <a:p>
+                      <a:r>
+                        <a:rPr lang="en-US" altLang="zh-CN" b="1" dirty="0">
+                          <a:latin typeface="Bradley Hand" pitchFamily="2" charset="0"/>
+                        </a:rPr>
+                        <a:t>2</a:t>
+                      </a:r>
+                      <a:endParaRPr lang="zh-CN" altLang="en-US" b="1" dirty="0">
+                        <a:latin typeface="Bradley Hand" pitchFamily="2" charset="0"/>
+                      </a:endParaRPr>
+                    </a:p>
+                  </a:txBody>
+                  <a:tcPr>
+                    <a:solidFill>
+                      <a:schemeClr val="accent6">
+                        <a:lumMod val="20000"/>
+                        <a:lumOff val="80000"/>
+                      </a:schemeClr>
+                    </a:solidFill>
+                  </a:tcPr>
+                </a:tc>
+                <a:extLst>
+                  <a:ext uri="{0D108BD9-81ED-4DB2-BD59-A6C34878D82A}">
+                    <a16:rowId xmlns:a16="http://schemas.microsoft.com/office/drawing/2014/main" val="1987917886"/>
+                  </a:ext>
+                </a:extLst>
+              </a:tr>
+              <a:tr h="172317">
+                <a:tc>
+                  <a:txBody>
+                    <a:bodyPr/>
+                    <a:lstStyle/>
+                    <a:p>
+                      <a:r>
+                        <a:rPr lang="en-US" altLang="zh-CN" b="1" dirty="0">
+                          <a:latin typeface="Bradley Hand" pitchFamily="2" charset="0"/>
+                        </a:rPr>
+                        <a:t>0</a:t>
+                      </a:r>
+                      <a:endParaRPr lang="zh-CN" altLang="en-US" b="1" dirty="0">
+                        <a:latin typeface="Bradley Hand" pitchFamily="2" charset="0"/>
+                      </a:endParaRPr>
+                    </a:p>
+                  </a:txBody>
+                  <a:tcPr>
+                    <a:solidFill>
+                      <a:schemeClr val="accent5">
+                        <a:lumMod val="20000"/>
+                        <a:lumOff val="80000"/>
+                      </a:schemeClr>
+                    </a:solidFill>
+                  </a:tcPr>
+                </a:tc>
+                <a:tc>
+                  <a:txBody>
+                    <a:bodyPr/>
+                    <a:lstStyle/>
+                    <a:p>
+                      <a:r>
+                        <a:rPr lang="en-US" altLang="zh-CN" dirty="0">
+                          <a:solidFill>
+                            <a:srgbClr val="0070C0"/>
+                          </a:solidFill>
+                          <a:latin typeface="Bradley Hand" pitchFamily="2" charset="0"/>
+                        </a:rPr>
+                        <a:t>0</a:t>
+                      </a:r>
+                      <a:endParaRPr lang="zh-CN" altLang="en-US" dirty="0">
+                        <a:solidFill>
+                          <a:srgbClr val="0070C0"/>
+                        </a:solidFill>
+                        <a:latin typeface="Bradley Hand" pitchFamily="2" charset="0"/>
+                      </a:endParaRPr>
+                    </a:p>
+                  </a:txBody>
+                  <a:tcPr/>
+                </a:tc>
+                <a:tc>
+                  <a:txBody>
+                    <a:bodyPr/>
+                    <a:lstStyle/>
+                    <a:p>
+                      <a:r>
+                        <a:rPr lang="en-US" altLang="zh-CN" dirty="0">
+                          <a:solidFill>
+                            <a:srgbClr val="0070C0"/>
+                          </a:solidFill>
+                          <a:latin typeface="Bradley Hand" pitchFamily="2" charset="0"/>
+                        </a:rPr>
+                        <a:t>2</a:t>
+                      </a:r>
+                      <a:endParaRPr lang="zh-CN" altLang="en-US" dirty="0">
+                        <a:solidFill>
+                          <a:srgbClr val="0070C0"/>
+                        </a:solidFill>
+                        <a:latin typeface="Bradley Hand" pitchFamily="2" charset="0"/>
+                      </a:endParaRPr>
+                    </a:p>
+                  </a:txBody>
+                  <a:tcPr/>
+                </a:tc>
+                <a:tc>
+                  <a:txBody>
+                    <a:bodyPr/>
+                    <a:lstStyle/>
+                    <a:p>
+                      <a:r>
+                        <a:rPr lang="en-US" altLang="zh-CN" dirty="0">
+                          <a:solidFill>
+                            <a:srgbClr val="0070C0"/>
+                          </a:solidFill>
+                          <a:latin typeface="Bradley Hand" pitchFamily="2" charset="0"/>
+                        </a:rPr>
+                        <a:t>4</a:t>
+                      </a:r>
+                      <a:endParaRPr lang="zh-CN" altLang="en-US" dirty="0">
+                        <a:solidFill>
+                          <a:srgbClr val="0070C0"/>
+                        </a:solidFill>
+                        <a:latin typeface="Bradley Hand" pitchFamily="2" charset="0"/>
+                      </a:endParaRPr>
+                    </a:p>
+                  </a:txBody>
+                  <a:tcPr/>
+                </a:tc>
+                <a:extLst>
+                  <a:ext uri="{0D108BD9-81ED-4DB2-BD59-A6C34878D82A}">
+                    <a16:rowId xmlns:a16="http://schemas.microsoft.com/office/drawing/2014/main" val="3207980719"/>
+                  </a:ext>
+                </a:extLst>
+              </a:tr>
+              <a:tr h="172317">
+                <a:tc>
+                  <a:txBody>
+                    <a:bodyPr/>
+                    <a:lstStyle/>
+                    <a:p>
+                      <a:r>
+                        <a:rPr lang="en-US" altLang="zh-CN" b="1" dirty="0">
+                          <a:latin typeface="Bradley Hand" pitchFamily="2" charset="0"/>
+                        </a:rPr>
+                        <a:t>1</a:t>
+                      </a:r>
+                      <a:endParaRPr lang="zh-CN" altLang="en-US" b="1" dirty="0">
+                        <a:latin typeface="Bradley Hand" pitchFamily="2" charset="0"/>
+                      </a:endParaRPr>
+                    </a:p>
+                  </a:txBody>
+                  <a:tcPr>
+                    <a:solidFill>
+                      <a:schemeClr val="accent5">
+                        <a:lumMod val="20000"/>
+                        <a:lumOff val="80000"/>
+                      </a:schemeClr>
+                    </a:solidFill>
+                  </a:tcPr>
+                </a:tc>
+                <a:tc>
+                  <a:txBody>
+                    <a:bodyPr/>
+                    <a:lstStyle/>
+                    <a:p>
+                      <a:r>
+                        <a:rPr lang="en-US" altLang="zh-CN" dirty="0">
+                          <a:solidFill>
+                            <a:srgbClr val="0070C0"/>
+                          </a:solidFill>
+                          <a:latin typeface="Bradley Hand" pitchFamily="2" charset="0"/>
+                        </a:rPr>
+                        <a:t>4</a:t>
+                      </a:r>
+                      <a:endParaRPr lang="zh-CN" altLang="en-US" dirty="0">
+                        <a:solidFill>
+                          <a:srgbClr val="0070C0"/>
+                        </a:solidFill>
+                        <a:latin typeface="Bradley Hand" pitchFamily="2" charset="0"/>
+                      </a:endParaRPr>
+                    </a:p>
+                  </a:txBody>
+                  <a:tcPr/>
+                </a:tc>
+                <a:tc>
+                  <a:txBody>
+                    <a:bodyPr/>
+                    <a:lstStyle/>
+                    <a:p>
+                      <a:r>
+                        <a:rPr lang="en-US" altLang="zh-CN" dirty="0">
+                          <a:solidFill>
+                            <a:srgbClr val="0070C0"/>
+                          </a:solidFill>
+                          <a:latin typeface="Bradley Hand" pitchFamily="2" charset="0"/>
+                        </a:rPr>
+                        <a:t>6</a:t>
+                      </a:r>
+                      <a:endParaRPr lang="zh-CN" altLang="en-US" dirty="0">
+                        <a:solidFill>
+                          <a:srgbClr val="0070C0"/>
+                        </a:solidFill>
+                        <a:latin typeface="Bradley Hand" pitchFamily="2" charset="0"/>
+                      </a:endParaRPr>
+                    </a:p>
+                  </a:txBody>
+                  <a:tcPr/>
+                </a:tc>
+                <a:tc>
+                  <a:txBody>
+                    <a:bodyPr/>
+                    <a:lstStyle/>
+                    <a:p>
+                      <a:r>
+                        <a:rPr lang="en-US" altLang="zh-CN" dirty="0">
+                          <a:solidFill>
+                            <a:srgbClr val="0070C0"/>
+                          </a:solidFill>
+                          <a:latin typeface="Bradley Hand" pitchFamily="2" charset="0"/>
+                        </a:rPr>
+                        <a:t>8</a:t>
+                      </a:r>
+                      <a:endParaRPr lang="zh-CN" altLang="en-US" dirty="0">
+                        <a:solidFill>
+                          <a:srgbClr val="0070C0"/>
+                        </a:solidFill>
+                        <a:latin typeface="Bradley Hand" pitchFamily="2" charset="0"/>
+                      </a:endParaRPr>
+                    </a:p>
+                  </a:txBody>
+                  <a:tcPr/>
+                </a:tc>
+                <a:extLst>
+                  <a:ext uri="{0D108BD9-81ED-4DB2-BD59-A6C34878D82A}">
+                    <a16:rowId xmlns:a16="http://schemas.microsoft.com/office/drawing/2014/main" val="510479521"/>
+                  </a:ext>
+                </a:extLst>
+              </a:tr>
+            </a:tbl>
+          </a:graphicData>
+        </a:graphic>
+      </p:graphicFrame>
+      <p:sp>
+        <p:nvSpPr>
+          <p:cNvPr id="15" name="文本框 14">
+            <a:extLst>
+              <a:ext uri="{FF2B5EF4-FFF2-40B4-BE49-F238E27FC236}">
+                <a16:creationId xmlns:a16="http://schemas.microsoft.com/office/drawing/2014/main" id="{45EEA010-2195-0BF8-ADDD-0BAED8703B4A}"/>
+              </a:ext>
+            </a:extLst>
+          </p:cNvPr>
+          <p:cNvSpPr txBox="1"/>
+          <p:nvPr/>
+        </p:nvSpPr>
+        <p:spPr>
+          <a:xfrm>
+            <a:off x="3520390" y="1723768"/>
+            <a:ext cx="2347049" cy="369332"/>
+          </a:xfrm>
+          <a:prstGeom prst="rect">
+            <a:avLst/>
+          </a:prstGeom>
+          <a:noFill/>
+        </p:spPr>
+        <p:txBody>
+          <a:bodyPr wrap="square" rtlCol="0">
+            <a:spAutoFit/>
+          </a:bodyPr>
+          <a:lstStyle/>
+          <a:p>
+            <a:r>
+              <a:rPr kumimoji="1" lang="en-US" altLang="zh-CN" dirty="0">
+                <a:latin typeface="Bradley Hand" pitchFamily="2" charset="0"/>
+              </a:rPr>
+              <a:t>Layout:</a:t>
+            </a:r>
+            <a:r>
+              <a:rPr kumimoji="1" lang="zh-CN" altLang="en-US" dirty="0">
+                <a:latin typeface="Bradley Hand" pitchFamily="2" charset="0"/>
+              </a:rPr>
+              <a:t>  </a:t>
+            </a:r>
+            <a:r>
+              <a:rPr kumimoji="1" lang="en-US" altLang="zh-CN" dirty="0">
+                <a:latin typeface="Bradley Hand" pitchFamily="2" charset="0"/>
+              </a:rPr>
+              <a:t>(2,</a:t>
+            </a:r>
+            <a:r>
+              <a:rPr kumimoji="1" lang="zh-CN" altLang="en-US" dirty="0">
+                <a:latin typeface="Bradley Hand" pitchFamily="2" charset="0"/>
+              </a:rPr>
+              <a:t> </a:t>
+            </a:r>
+            <a:r>
+              <a:rPr kumimoji="1" lang="en-US" altLang="zh-CN" dirty="0">
+                <a:latin typeface="Bradley Hand" pitchFamily="2" charset="0"/>
+              </a:rPr>
+              <a:t>3)</a:t>
+            </a:r>
+            <a:r>
+              <a:rPr kumimoji="1" lang="en-US" altLang="zh-CN" dirty="0">
+                <a:latin typeface="Bradley Hand" pitchFamily="2" charset="0"/>
+                <a:sym typeface="Wingdings" pitchFamily="2" charset="2"/>
+              </a:rPr>
+              <a:t>:(4,2)</a:t>
+            </a:r>
+            <a:endParaRPr kumimoji="1" lang="zh-CN" altLang="en-US" dirty="0">
+              <a:latin typeface="Bradley Hand" pitchFamily="2" charset="0"/>
+            </a:endParaRPr>
+          </a:p>
+        </p:txBody>
+      </p:sp>
+      <p:sp>
+        <p:nvSpPr>
+          <p:cNvPr id="18" name="椭圆 17">
+            <a:extLst>
+              <a:ext uri="{FF2B5EF4-FFF2-40B4-BE49-F238E27FC236}">
+                <a16:creationId xmlns:a16="http://schemas.microsoft.com/office/drawing/2014/main" id="{36086CE6-6F42-F1FB-B0AF-A75D1AC61D5F}"/>
+              </a:ext>
+            </a:extLst>
+          </p:cNvPr>
+          <p:cNvSpPr/>
+          <p:nvPr/>
+        </p:nvSpPr>
+        <p:spPr>
+          <a:xfrm>
+            <a:off x="3944979" y="2447109"/>
+            <a:ext cx="1497874" cy="758593"/>
+          </a:xfrm>
+          <a:prstGeom prst="ellipse">
+            <a:avLst/>
+          </a:prstGeom>
+          <a:noFill/>
+          <a:ln>
+            <a:solidFill>
+              <a:srgbClr val="FF0000"/>
+            </a:solidFill>
+          </a:ln>
+        </p:spPr>
+        <p:style>
+          <a:lnRef idx="2">
+            <a:schemeClr val="accent1">
+              <a:shade val="15000"/>
+            </a:schemeClr>
+          </a:lnRef>
+          <a:fillRef idx="1">
+            <a:schemeClr val="accent1"/>
+          </a:fillRef>
+          <a:effectRef idx="0">
+            <a:schemeClr val="accent1"/>
+          </a:effectRef>
+          <a:fontRef idx="minor">
+            <a:schemeClr val="lt1"/>
+          </a:fontRef>
+        </p:style>
+        <p:txBody>
+          <a:bodyPr rtlCol="0" anchor="ctr"/>
+          <a:lstStyle/>
+          <a:p>
+            <a:pPr algn="ctr"/>
+            <a:endParaRPr kumimoji="1" lang="zh-CN" altLang="en-US"/>
+          </a:p>
+        </p:txBody>
+      </p:sp>
+      <p:sp>
+        <p:nvSpPr>
+          <p:cNvPr id="19" name="文本框 18">
+            <a:extLst>
+              <a:ext uri="{FF2B5EF4-FFF2-40B4-BE49-F238E27FC236}">
+                <a16:creationId xmlns:a16="http://schemas.microsoft.com/office/drawing/2014/main" id="{C35A8E1C-3D7F-E3E9-4D76-CC0B4B50ACA6}"/>
+              </a:ext>
+            </a:extLst>
+          </p:cNvPr>
+          <p:cNvSpPr txBox="1"/>
+          <p:nvPr/>
+        </p:nvSpPr>
+        <p:spPr>
+          <a:xfrm>
+            <a:off x="3944979" y="3429000"/>
+            <a:ext cx="2246812" cy="369332"/>
+          </a:xfrm>
+          <a:prstGeom prst="rect">
+            <a:avLst/>
+          </a:prstGeom>
+          <a:noFill/>
+        </p:spPr>
+        <p:txBody>
+          <a:bodyPr wrap="square" rtlCol="0">
+            <a:spAutoFit/>
+          </a:bodyPr>
+          <a:lstStyle/>
+          <a:p>
+            <a:r>
+              <a:rPr kumimoji="1" lang="en-US" altLang="zh-CN" dirty="0">
+                <a:latin typeface="Bradley Hand" pitchFamily="2" charset="0"/>
+              </a:rPr>
+              <a:t>mapped</a:t>
+            </a:r>
+            <a:r>
+              <a:rPr kumimoji="1" lang="zh-CN" altLang="en-US" dirty="0">
+                <a:latin typeface="Bradley Hand" pitchFamily="2" charset="0"/>
+              </a:rPr>
+              <a:t> </a:t>
+            </a:r>
+            <a:r>
+              <a:rPr kumimoji="1" lang="en-US" altLang="zh-CN" dirty="0">
+                <a:latin typeface="Bradley Hand" pitchFamily="2" charset="0"/>
+              </a:rPr>
+              <a:t>1-D</a:t>
+            </a:r>
+            <a:r>
+              <a:rPr kumimoji="1" lang="zh-CN" altLang="en-US" dirty="0">
+                <a:latin typeface="Bradley Hand" pitchFamily="2" charset="0"/>
+              </a:rPr>
+              <a:t> </a:t>
+            </a:r>
+            <a:r>
+              <a:rPr kumimoji="1" lang="en-US" altLang="zh-CN" dirty="0">
+                <a:latin typeface="Bradley Hand" pitchFamily="2" charset="0"/>
+              </a:rPr>
+              <a:t>indices</a:t>
+            </a:r>
+            <a:endParaRPr kumimoji="1" lang="zh-CN" altLang="en-US" dirty="0">
+              <a:latin typeface="Bradley Hand" pitchFamily="2" charset="0"/>
+            </a:endParaRPr>
+          </a:p>
+        </p:txBody>
+      </p:sp>
+      <p:cxnSp>
+        <p:nvCxnSpPr>
+          <p:cNvPr id="22" name="曲线连接符 21">
+            <a:extLst>
+              <a:ext uri="{FF2B5EF4-FFF2-40B4-BE49-F238E27FC236}">
+                <a16:creationId xmlns:a16="http://schemas.microsoft.com/office/drawing/2014/main" id="{20973886-BB87-FD80-BACE-ED4ADB951BA5}"/>
+              </a:ext>
+            </a:extLst>
+          </p:cNvPr>
+          <p:cNvCxnSpPr>
+            <a:cxnSpLocks/>
+            <a:stCxn id="19" idx="1"/>
+            <a:endCxn id="18" idx="4"/>
+          </p:cNvCxnSpPr>
+          <p:nvPr/>
+        </p:nvCxnSpPr>
+        <p:spPr>
+          <a:xfrm rot="10800000" flipH="1">
+            <a:off x="3944978" y="3205702"/>
+            <a:ext cx="748937" cy="407964"/>
+          </a:xfrm>
+          <a:prstGeom prst="curvedConnector4">
+            <a:avLst>
+              <a:gd name="adj1" fmla="val -30523"/>
+              <a:gd name="adj2" fmla="val 72633"/>
+            </a:avLst>
+          </a:prstGeom>
+          <a:ln w="19050">
+            <a:solidFill>
+              <a:srgbClr val="FF0000"/>
+            </a:solidFill>
+            <a:headEnd w="sm" len="lg"/>
+            <a:tailEnd type="triangle" w="med" len="lg"/>
+          </a:ln>
+        </p:spPr>
+        <p:style>
+          <a:lnRef idx="2">
+            <a:schemeClr val="accent1"/>
+          </a:lnRef>
+          <a:fillRef idx="0">
+            <a:schemeClr val="accent1"/>
+          </a:fillRef>
+          <a:effectRef idx="1">
+            <a:schemeClr val="accent1"/>
+          </a:effectRef>
+          <a:fontRef idx="minor">
+            <a:schemeClr val="tx1"/>
+          </a:fontRef>
+        </p:style>
+      </p:cxnSp>
+    </p:spTree>
+    <p:extLst>
+      <p:ext uri="{BB962C8B-B14F-4D97-AF65-F5344CB8AC3E}">
+        <p14:creationId xmlns:p14="http://schemas.microsoft.com/office/powerpoint/2010/main" val="3368892497"/>
       </p:ext>
     </p:extLst>
   </p:cSld>

</xml_diff>